<commit_message>
ModelClassDiagram: update with current structure
The ModelClassDiagram illustrated the Address Book structure. The diagram has been updated to reflect our Concierge structure.
</commit_message>
<xml_diff>
--- a/docs/diagrams/ModelComponentClassDiagram.pptx
+++ b/docs/diagrams/ModelComponentClassDiagram.pptx
@@ -5,10 +5,11 @@
     <p:sldMasterId id="2147483648" r:id="rId1"/>
   </p:sldMasterIdLst>
   <p:notesMasterIdLst>
-    <p:notesMasterId r:id="rId3"/>
+    <p:notesMasterId r:id="rId4"/>
   </p:notesMasterIdLst>
   <p:sldIdLst>
     <p:sldId id="263" r:id="rId2"/>
+    <p:sldId id="264" r:id="rId3"/>
   </p:sldIdLst>
   <p:sldSz cx="9144000" cy="6858000" type="screen4x3"/>
   <p:notesSz cx="6858000" cy="9144000"/>
@@ -208,7 +209,7 @@
           <a:p>
             <a:fld id="{F5CC4B3F-88C1-4FFA-B1B6-F41C21DC6924}" type="datetimeFigureOut">
               <a:rPr lang="en-US" smtClean="0"/>
-              <a:t>6/27/2018</a:t>
+              <a:t>11/11/2018</a:t>
             </a:fld>
             <a:endParaRPr lang="en-US"/>
           </a:p>
@@ -654,7 +655,7 @@
           <a:p>
             <a:fld id="{78C97017-6FC3-485B-9764-EAC9E56C1D49}" type="datetimeFigureOut">
               <a:rPr lang="en-US" smtClean="0"/>
-              <a:t>6/27/2018</a:t>
+              <a:t>11/11/2018</a:t>
             </a:fld>
             <a:endParaRPr lang="en-US"/>
           </a:p>
@@ -822,7 +823,7 @@
           <a:p>
             <a:fld id="{78C97017-6FC3-485B-9764-EAC9E56C1D49}" type="datetimeFigureOut">
               <a:rPr lang="en-US" smtClean="0"/>
-              <a:t>6/27/2018</a:t>
+              <a:t>11/11/2018</a:t>
             </a:fld>
             <a:endParaRPr lang="en-US"/>
           </a:p>
@@ -1000,7 +1001,7 @@
           <a:p>
             <a:fld id="{78C97017-6FC3-485B-9764-EAC9E56C1D49}" type="datetimeFigureOut">
               <a:rPr lang="en-US" smtClean="0"/>
-              <a:t>6/27/2018</a:t>
+              <a:t>11/11/2018</a:t>
             </a:fld>
             <a:endParaRPr lang="en-US"/>
           </a:p>
@@ -1168,7 +1169,7 @@
           <a:p>
             <a:fld id="{78C97017-6FC3-485B-9764-EAC9E56C1D49}" type="datetimeFigureOut">
               <a:rPr lang="en-US" smtClean="0"/>
-              <a:t>6/27/2018</a:t>
+              <a:t>11/11/2018</a:t>
             </a:fld>
             <a:endParaRPr lang="en-US"/>
           </a:p>
@@ -1413,7 +1414,7 @@
           <a:p>
             <a:fld id="{78C97017-6FC3-485B-9764-EAC9E56C1D49}" type="datetimeFigureOut">
               <a:rPr lang="en-US" smtClean="0"/>
-              <a:t>6/27/2018</a:t>
+              <a:t>11/11/2018</a:t>
             </a:fld>
             <a:endParaRPr lang="en-US"/>
           </a:p>
@@ -1698,7 +1699,7 @@
           <a:p>
             <a:fld id="{78C97017-6FC3-485B-9764-EAC9E56C1D49}" type="datetimeFigureOut">
               <a:rPr lang="en-US" smtClean="0"/>
-              <a:t>6/27/2018</a:t>
+              <a:t>11/11/2018</a:t>
             </a:fld>
             <a:endParaRPr lang="en-US"/>
           </a:p>
@@ -2117,7 +2118,7 @@
           <a:p>
             <a:fld id="{78C97017-6FC3-485B-9764-EAC9E56C1D49}" type="datetimeFigureOut">
               <a:rPr lang="en-US" smtClean="0"/>
-              <a:t>6/27/2018</a:t>
+              <a:t>11/11/2018</a:t>
             </a:fld>
             <a:endParaRPr lang="en-US"/>
           </a:p>
@@ -2234,7 +2235,7 @@
           <a:p>
             <a:fld id="{78C97017-6FC3-485B-9764-EAC9E56C1D49}" type="datetimeFigureOut">
               <a:rPr lang="en-US" smtClean="0"/>
-              <a:t>6/27/2018</a:t>
+              <a:t>11/11/2018</a:t>
             </a:fld>
             <a:endParaRPr lang="en-US"/>
           </a:p>
@@ -2329,7 +2330,7 @@
           <a:p>
             <a:fld id="{78C97017-6FC3-485B-9764-EAC9E56C1D49}" type="datetimeFigureOut">
               <a:rPr lang="en-US" smtClean="0"/>
-              <a:t>6/27/2018</a:t>
+              <a:t>11/11/2018</a:t>
             </a:fld>
             <a:endParaRPr lang="en-US"/>
           </a:p>
@@ -2604,7 +2605,7 @@
           <a:p>
             <a:fld id="{78C97017-6FC3-485B-9764-EAC9E56C1D49}" type="datetimeFigureOut">
               <a:rPr lang="en-US" smtClean="0"/>
-              <a:t>6/27/2018</a:t>
+              <a:t>11/11/2018</a:t>
             </a:fld>
             <a:endParaRPr lang="en-US"/>
           </a:p>
@@ -2856,7 +2857,7 @@
           <a:p>
             <a:fld id="{78C97017-6FC3-485B-9764-EAC9E56C1D49}" type="datetimeFigureOut">
               <a:rPr lang="en-US" smtClean="0"/>
-              <a:t>6/27/2018</a:t>
+              <a:t>11/11/2018</a:t>
             </a:fld>
             <a:endParaRPr lang="en-US"/>
           </a:p>
@@ -3067,7 +3068,7 @@
           <a:p>
             <a:fld id="{78C97017-6FC3-485B-9764-EAC9E56C1D49}" type="datetimeFigureOut">
               <a:rPr lang="en-US" smtClean="0"/>
-              <a:t>6/27/2018</a:t>
+              <a:t>11/11/2018</a:t>
             </a:fld>
             <a:endParaRPr lang="en-US"/>
           </a:p>
@@ -3444,14 +3445,20 @@
       </p:grpSpPr>
       <p:sp>
         <p:nvSpPr>
-          <p:cNvPr id="118" name="Rectangle 65"/>
+          <p:cNvPr id="131" name="Rectangle 65">
+            <a:extLst>
+              <a:ext uri="{FF2B5EF4-FFF2-40B4-BE49-F238E27FC236}">
+                <a16:creationId xmlns:a16="http://schemas.microsoft.com/office/drawing/2014/main" id="{A5EA9E79-EF11-4483-8639-335C33DD197D}"/>
+              </a:ext>
+            </a:extLst>
+          </p:cNvPr>
           <p:cNvSpPr/>
           <p:nvPr/>
         </p:nvSpPr>
         <p:spPr>
           <a:xfrm>
-            <a:off x="1119865" y="1600200"/>
-            <a:ext cx="7490735" cy="3124200"/>
+            <a:off x="609600" y="1650160"/>
+            <a:ext cx="8153399" cy="4287720"/>
           </a:xfrm>
           <a:prstGeom prst="roundRect">
             <a:avLst>
@@ -3511,7 +3518,7 @@
         </p:nvSpPr>
         <p:spPr>
           <a:xfrm>
-            <a:off x="2877180" y="3463240"/>
+            <a:off x="2424289" y="3463240"/>
             <a:ext cx="1093635" cy="346760"/>
           </a:xfrm>
           <a:prstGeom prst="rect">
@@ -3570,7 +3577,7 @@
         </p:nvSpPr>
         <p:spPr>
           <a:xfrm rot="16200000">
-            <a:off x="1661548" y="3097750"/>
+            <a:off x="1208657" y="3097750"/>
             <a:ext cx="1093635" cy="346760"/>
           </a:xfrm>
           <a:prstGeom prst="rect">
@@ -3632,13 +3639,13 @@
           <p:nvPr/>
         </p:nvCxnSpPr>
         <p:spPr>
-          <a:xfrm rot="5400000" flipH="1" flipV="1">
-            <a:off x="4131507" y="1281685"/>
-            <a:ext cx="613122" cy="4459404"/>
+          <a:xfrm rot="16200000" flipH="1">
+            <a:off x="3553515" y="2019907"/>
+            <a:ext cx="1205741" cy="4801821"/>
           </a:xfrm>
           <a:prstGeom prst="bentConnector3">
             <a:avLst>
-              <a:gd name="adj1" fmla="val -26668"/>
+              <a:gd name="adj1" fmla="val 118959"/>
             </a:avLst>
           </a:prstGeom>
           <a:ln w="19050">
@@ -3674,7 +3681,7 @@
         </p:nvSpPr>
         <p:spPr>
           <a:xfrm rot="16200000">
-            <a:off x="956202" y="2861202"/>
+            <a:off x="503311" y="2861202"/>
             <a:ext cx="1093635" cy="346760"/>
           </a:xfrm>
           <a:prstGeom prst="rect">
@@ -3744,7 +3751,7 @@
         </p:nvSpPr>
         <p:spPr>
           <a:xfrm rot="16200000">
-            <a:off x="1626910" y="2952291"/>
+            <a:off x="1174019" y="2952291"/>
             <a:ext cx="270504" cy="175523"/>
           </a:xfrm>
           <a:prstGeom prst="triangle">
@@ -3794,7 +3801,7 @@
         </p:nvCxnSpPr>
         <p:spPr>
           <a:xfrm>
-            <a:off x="2609828" y="3636620"/>
+            <a:off x="2156937" y="3636620"/>
             <a:ext cx="267352" cy="0"/>
           </a:xfrm>
           <a:prstGeom prst="straightConnector1">
@@ -3832,7 +3839,7 @@
         </p:nvCxnSpPr>
         <p:spPr>
           <a:xfrm>
-            <a:off x="910091" y="3040053"/>
+            <a:off x="457200" y="3040053"/>
             <a:ext cx="419548" cy="2860"/>
           </a:xfrm>
           <a:prstGeom prst="bentConnector3">
@@ -3877,7 +3884,7 @@
         </p:nvCxnSpPr>
         <p:spPr>
           <a:xfrm flipV="1">
-            <a:off x="1849924" y="3040052"/>
+            <a:off x="1397033" y="3040052"/>
             <a:ext cx="216105" cy="1"/>
           </a:xfrm>
           <a:prstGeom prst="line">
@@ -3916,7 +3923,7 @@
         </p:nvSpPr>
         <p:spPr>
           <a:xfrm>
-            <a:off x="2373780" y="3549930"/>
+            <a:off x="1920889" y="3549930"/>
             <a:ext cx="236048" cy="173380"/>
           </a:xfrm>
           <a:prstGeom prst="flowChartDecision">
@@ -3961,7 +3968,7 @@
         </p:nvSpPr>
         <p:spPr>
           <a:xfrm>
-            <a:off x="2825280" y="2846162"/>
+            <a:off x="2372389" y="2846162"/>
             <a:ext cx="1490560" cy="334856"/>
           </a:xfrm>
           <a:prstGeom prst="rect">
@@ -3994,12 +4001,12 @@
           <a:p>
             <a:pPr algn="ctr"/>
             <a:r>
-              <a:rPr lang="en-US" sz="1050" dirty="0" err="1" smtClean="0">
+              <a:rPr lang="en-US" sz="1050" dirty="0" err="1">
                 <a:solidFill>
                   <a:srgbClr val="7030A0"/>
                 </a:solidFill>
               </a:rPr>
-              <a:t>VersionedAddressBook</a:t>
+              <a:t>VersionedConcierge</a:t>
             </a:r>
             <a:endParaRPr lang="en-SG" sz="1050" dirty="0">
               <a:solidFill>
@@ -4020,7 +4027,7 @@
         </p:nvCxnSpPr>
         <p:spPr>
           <a:xfrm>
-            <a:off x="2624360" y="3003033"/>
+            <a:off x="2171469" y="3003033"/>
             <a:ext cx="200920" cy="10557"/>
           </a:xfrm>
           <a:prstGeom prst="straightConnector1">
@@ -4058,7 +4065,7 @@
         </p:nvSpPr>
         <p:spPr>
           <a:xfrm>
-            <a:off x="2388312" y="2916343"/>
+            <a:off x="1935421" y="2916343"/>
             <a:ext cx="236048" cy="173380"/>
           </a:xfrm>
           <a:prstGeom prst="flowChartDecision">
@@ -4103,7 +4110,7 @@
         </p:nvSpPr>
         <p:spPr>
           <a:xfrm>
-            <a:off x="4692650" y="2846162"/>
+            <a:off x="4429776" y="4674223"/>
             <a:ext cx="1156969" cy="346760"/>
           </a:xfrm>
           <a:prstGeom prst="rect">
@@ -4141,7 +4148,7 @@
                   <a:srgbClr val="7030A0"/>
                 </a:solidFill>
               </a:rPr>
-              <a:t>UniquePersonList</a:t>
+              <a:t>UniqueGuestList</a:t>
             </a:r>
             <a:endParaRPr lang="en-SG" sz="1050" dirty="0">
               <a:solidFill>
@@ -4159,7 +4166,7 @@
         </p:nvSpPr>
         <p:spPr>
           <a:xfrm>
-            <a:off x="4324972" y="2920532"/>
+            <a:off x="3872081" y="2920532"/>
             <a:ext cx="236048" cy="173380"/>
           </a:xfrm>
           <a:prstGeom prst="flowChartDecision">
@@ -4206,7 +4213,7 @@
         </p:nvSpPr>
         <p:spPr>
           <a:xfrm>
-            <a:off x="6313677" y="2858066"/>
+            <a:off x="6203203" y="4676929"/>
             <a:ext cx="708186" cy="346760"/>
           </a:xfrm>
           <a:prstGeom prst="rect">
@@ -4244,7 +4251,7 @@
                   <a:srgbClr val="7030A0"/>
                 </a:solidFill>
               </a:rPr>
-              <a:t>Person</a:t>
+              <a:t>Guest</a:t>
             </a:r>
             <a:endParaRPr lang="en-SG" sz="1050" dirty="0">
               <a:solidFill>
@@ -4262,7 +4269,7 @@
         </p:nvSpPr>
         <p:spPr>
           <a:xfrm>
-            <a:off x="5858751" y="2941676"/>
+            <a:off x="5595877" y="4760913"/>
             <a:ext cx="236048" cy="173380"/>
           </a:xfrm>
           <a:prstGeom prst="flowChartDecision">
@@ -4303,6 +4310,7 @@
         <p:nvCxnSpPr>
           <p:cNvPr id="64" name="Elbow Connector 63"/>
           <p:cNvCxnSpPr>
+            <a:cxnSpLocks/>
             <a:stCxn id="63" idx="3"/>
             <a:endCxn id="62" idx="1"/>
           </p:cNvCxnSpPr>
@@ -4310,8 +4318,8 @@
         </p:nvCxnSpPr>
         <p:spPr>
           <a:xfrm>
-            <a:off x="6094799" y="3028366"/>
-            <a:ext cx="218878" cy="3080"/>
+            <a:off x="5831925" y="4847603"/>
+            <a:ext cx="371278" cy="2706"/>
           </a:xfrm>
           <a:prstGeom prst="bentConnector3">
             <a:avLst/>
@@ -4348,8 +4356,8 @@
         </p:nvSpPr>
         <p:spPr>
           <a:xfrm>
-            <a:off x="7712397" y="2564238"/>
-            <a:ext cx="708186" cy="285783"/>
+            <a:off x="7601923" y="4364990"/>
+            <a:ext cx="1012984" cy="285783"/>
           </a:xfrm>
           <a:prstGeom prst="rect">
             <a:avLst/>
@@ -4404,7 +4412,7 @@
         </p:nvSpPr>
         <p:spPr>
           <a:xfrm>
-            <a:off x="7041947" y="2948201"/>
+            <a:off x="6931473" y="4748953"/>
             <a:ext cx="236048" cy="173380"/>
           </a:xfrm>
           <a:prstGeom prst="flowChartDecision">
@@ -4453,7 +4461,7 @@
         </p:nvCxnSpPr>
         <p:spPr>
           <a:xfrm flipV="1">
-            <a:off x="7277995" y="2706821"/>
+            <a:off x="7167521" y="4507573"/>
             <a:ext cx="434402" cy="327761"/>
           </a:xfrm>
           <a:prstGeom prst="bentConnector3">
@@ -4491,8 +4499,8 @@
         </p:nvSpPr>
         <p:spPr>
           <a:xfrm>
-            <a:off x="7712397" y="2887216"/>
-            <a:ext cx="708186" cy="285783"/>
+            <a:off x="7601923" y="4687968"/>
+            <a:ext cx="1012984" cy="285783"/>
           </a:xfrm>
           <a:prstGeom prst="rect">
             <a:avLst/>
@@ -4543,6 +4551,7 @@
         <p:nvCxnSpPr>
           <p:cNvPr id="81" name="Elbow Connector 80"/>
           <p:cNvCxnSpPr>
+            <a:cxnSpLocks/>
             <a:stCxn id="78" idx="3"/>
             <a:endCxn id="80" idx="1"/>
           </p:cNvCxnSpPr>
@@ -4550,7 +4559,7 @@
         </p:nvCxnSpPr>
         <p:spPr>
           <a:xfrm flipV="1">
-            <a:off x="7277995" y="3030108"/>
+            <a:off x="7167521" y="4830860"/>
             <a:ext cx="434402" cy="4783"/>
           </a:xfrm>
           <a:prstGeom prst="bentConnector3">
@@ -4588,8 +4597,8 @@
         </p:nvSpPr>
         <p:spPr>
           <a:xfrm>
-            <a:off x="7712397" y="3210194"/>
-            <a:ext cx="708186" cy="285783"/>
+            <a:off x="7601923" y="5010946"/>
+            <a:ext cx="1012984" cy="285783"/>
           </a:xfrm>
           <a:prstGeom prst="rect">
             <a:avLst/>
@@ -4640,6 +4649,7 @@
         <p:nvCxnSpPr>
           <p:cNvPr id="84" name="Elbow Connector 83"/>
           <p:cNvCxnSpPr>
+            <a:cxnSpLocks/>
             <a:stCxn id="78" idx="3"/>
             <a:endCxn id="83" idx="1"/>
           </p:cNvCxnSpPr>
@@ -4647,7 +4657,7 @@
         </p:nvCxnSpPr>
         <p:spPr>
           <a:xfrm>
-            <a:off x="7277995" y="3034891"/>
+            <a:off x="7167521" y="4835643"/>
             <a:ext cx="434402" cy="318195"/>
           </a:xfrm>
           <a:prstGeom prst="bentConnector3">
@@ -4677,18 +4687,61 @@
           </a:fontRef>
         </p:style>
       </p:cxnSp>
-      <p:sp>
-        <p:nvSpPr>
-          <p:cNvPr id="85" name="Rectangle 8"/>
+      <p:cxnSp>
+        <p:nvCxnSpPr>
+          <p:cNvPr id="97" name="Elbow Connector 63"/>
+          <p:cNvCxnSpPr>
+            <a:stCxn id="99" idx="3"/>
+          </p:cNvCxnSpPr>
+          <p:nvPr/>
+        </p:nvCxnSpPr>
+        <p:spPr>
+          <a:xfrm rot="5400000">
+            <a:off x="3100720" y="2687559"/>
+            <a:ext cx="293825" cy="5938"/>
+          </a:xfrm>
+          <a:prstGeom prst="bentConnector3">
+            <a:avLst>
+              <a:gd name="adj1" fmla="val 50000"/>
+            </a:avLst>
+          </a:prstGeom>
+          <a:ln w="19050">
+            <a:solidFill>
+              <a:srgbClr val="7030A0"/>
+            </a:solidFill>
+            <a:prstDash val="sysDot"/>
+            <a:headEnd type="none" w="med" len="med"/>
+            <a:tailEnd type="none" w="med" len="med"/>
+          </a:ln>
+          <a:effectLst/>
+        </p:spPr>
+        <p:style>
+          <a:lnRef idx="1">
+            <a:schemeClr val="accent2"/>
+          </a:lnRef>
+          <a:fillRef idx="2">
+            <a:schemeClr val="accent2"/>
+          </a:fillRef>
+          <a:effectRef idx="1">
+            <a:schemeClr val="accent2"/>
+          </a:effectRef>
+          <a:fontRef idx="minor">
+            <a:schemeClr val="dk1"/>
+          </a:fontRef>
+        </p:style>
+      </p:cxnSp>
+      <p:sp>
+        <p:nvSpPr>
+          <p:cNvPr id="99" name="Isosceles Triangle 102"/>
           <p:cNvSpPr/>
           <p:nvPr/>
         </p:nvSpPr>
         <p:spPr>
-          <a:xfrm>
-            <a:off x="7712397" y="3533171"/>
-            <a:ext cx="708186" cy="285783"/>
-          </a:xfrm>
-          <a:prstGeom prst="rect">
+          <a:xfrm rot="10800000" flipV="1">
+            <a:off x="3109408" y="2386554"/>
+            <a:ext cx="282387" cy="157062"/>
+          </a:xfrm>
+          <a:prstGeom prst="triangle">
             <a:avLst/>
           </a:prstGeom>
           <a:ln w="19050">
@@ -4717,118 +4770,26 @@
           <a:lstStyle/>
           <a:p>
             <a:pPr algn="ctr"/>
-            <a:r>
-              <a:rPr lang="en-US" sz="1050" dirty="0">
-                <a:solidFill>
-                  <a:srgbClr val="7030A0"/>
-                </a:solidFill>
-              </a:rPr>
-              <a:t>Address</a:t>
-            </a:r>
-            <a:endParaRPr lang="en-SG" sz="1050" dirty="0">
+            <a:endParaRPr lang="en-SG" sz="1050" b="1">
               <a:solidFill>
-                <a:srgbClr val="7030A0"/>
+                <a:srgbClr val="92D050"/>
               </a:solidFill>
             </a:endParaRPr>
           </a:p>
         </p:txBody>
       </p:sp>
-      <p:cxnSp>
-        <p:nvCxnSpPr>
-          <p:cNvPr id="86" name="Elbow Connector 85"/>
-          <p:cNvCxnSpPr>
-            <a:stCxn id="78" idx="3"/>
-            <a:endCxn id="85" idx="1"/>
-          </p:cNvCxnSpPr>
-          <p:nvPr/>
-        </p:nvCxnSpPr>
-        <p:spPr>
-          <a:xfrm>
-            <a:off x="7277995" y="3034891"/>
-            <a:ext cx="434402" cy="641172"/>
-          </a:xfrm>
-          <a:prstGeom prst="bentConnector3">
-            <a:avLst/>
-          </a:prstGeom>
-          <a:ln w="19050">
-            <a:solidFill>
-              <a:srgbClr val="7030A0"/>
-            </a:solidFill>
-            <a:headEnd type="none" w="med" len="med"/>
-            <a:tailEnd type="arrow" w="med" len="med"/>
-          </a:ln>
-          <a:effectLst/>
-        </p:spPr>
-        <p:style>
-          <a:lnRef idx="1">
-            <a:schemeClr val="accent2"/>
-          </a:lnRef>
-          <a:fillRef idx="2">
-            <a:schemeClr val="accent2"/>
-          </a:fillRef>
-          <a:effectRef idx="1">
-            <a:schemeClr val="accent2"/>
-          </a:effectRef>
-          <a:fontRef idx="minor">
-            <a:schemeClr val="dk1"/>
-          </a:fontRef>
-        </p:style>
-      </p:cxnSp>
-      <p:cxnSp>
-        <p:nvCxnSpPr>
-          <p:cNvPr id="97" name="Elbow Connector 63"/>
-          <p:cNvCxnSpPr>
-            <a:stCxn id="99" idx="3"/>
-          </p:cNvCxnSpPr>
-          <p:nvPr/>
-        </p:nvCxnSpPr>
-        <p:spPr>
-          <a:xfrm rot="5400000">
-            <a:off x="3553611" y="2687559"/>
-            <a:ext cx="293825" cy="5938"/>
-          </a:xfrm>
-          <a:prstGeom prst="bentConnector3">
-            <a:avLst>
-              <a:gd name="adj1" fmla="val 50000"/>
-            </a:avLst>
-          </a:prstGeom>
-          <a:ln w="19050">
-            <a:solidFill>
-              <a:srgbClr val="7030A0"/>
-            </a:solidFill>
-            <a:prstDash val="sysDot"/>
-            <a:headEnd type="none" w="med" len="med"/>
-            <a:tailEnd type="none" w="med" len="med"/>
-          </a:ln>
-          <a:effectLst/>
-        </p:spPr>
-        <p:style>
-          <a:lnRef idx="1">
-            <a:schemeClr val="accent2"/>
-          </a:lnRef>
-          <a:fillRef idx="2">
-            <a:schemeClr val="accent2"/>
-          </a:fillRef>
-          <a:effectRef idx="1">
-            <a:schemeClr val="accent2"/>
-          </a:effectRef>
-          <a:fontRef idx="minor">
-            <a:schemeClr val="dk1"/>
-          </a:fontRef>
-        </p:style>
-      </p:cxnSp>
-      <p:sp>
-        <p:nvSpPr>
-          <p:cNvPr id="99" name="Isosceles Triangle 102"/>
+      <p:sp>
+        <p:nvSpPr>
+          <p:cNvPr id="100" name="Rectangle 8"/>
           <p:cNvSpPr/>
           <p:nvPr/>
         </p:nvSpPr>
         <p:spPr>
-          <a:xfrm rot="10800000" flipV="1">
-            <a:off x="3562299" y="2386554"/>
-            <a:ext cx="282387" cy="157062"/>
-          </a:xfrm>
-          <a:prstGeom prst="triangle">
+          <a:xfrm>
+            <a:off x="808031" y="1998350"/>
+            <a:ext cx="1443661" cy="364396"/>
+          </a:xfrm>
+          <a:prstGeom prst="rect">
             <a:avLst/>
           </a:prstGeom>
           <a:ln w="19050">
@@ -4857,9 +4818,32 @@
           <a:lstStyle/>
           <a:p>
             <a:pPr algn="ctr"/>
-            <a:endParaRPr lang="en-SG" sz="1050" b="1">
+            <a:r>
+              <a:rPr lang="en-US" sz="1050" dirty="0">
+                <a:solidFill>
+                  <a:srgbClr val="7030A0"/>
+                </a:solidFill>
+              </a:rPr>
+              <a:t>&lt;&lt;interface&gt;&gt;</a:t>
+            </a:r>
+            <a:br>
+              <a:rPr lang="en-US" sz="1050" dirty="0">
+                <a:solidFill>
+                  <a:srgbClr val="7030A0"/>
+                </a:solidFill>
+              </a:rPr>
+            </a:br>
+            <a:r>
+              <a:rPr lang="en-US" sz="1050" dirty="0" err="1">
+                <a:solidFill>
+                  <a:srgbClr val="7030A0"/>
+                </a:solidFill>
+              </a:rPr>
+              <a:t>ReadOnlyConcierge</a:t>
+            </a:r>
+            <a:endParaRPr lang="en-SG" sz="1050" dirty="0">
               <a:solidFill>
-                <a:srgbClr val="92D050"/>
+                <a:srgbClr val="7030A0"/>
               </a:solidFill>
             </a:endParaRPr>
           </a:p>
@@ -4867,14 +4851,53 @@
       </p:sp>
       <p:sp>
         <p:nvSpPr>
-          <p:cNvPr id="100" name="Rectangle 8"/>
+          <p:cNvPr id="114" name="TextBox 113"/>
+          <p:cNvSpPr txBox="1"/>
+          <p:nvPr/>
+        </p:nvSpPr>
+        <p:spPr>
+          <a:xfrm>
+            <a:off x="5566909" y="5264989"/>
+            <a:ext cx="881018" cy="261610"/>
+          </a:xfrm>
+          <a:prstGeom prst="rect">
+            <a:avLst/>
+          </a:prstGeom>
+          <a:noFill/>
+        </p:spPr>
+        <p:txBody>
+          <a:bodyPr wrap="square" rtlCol="0">
+            <a:spAutoFit/>
+          </a:bodyPr>
+          <a:lstStyle/>
+          <a:p>
+            <a:pPr algn="r"/>
+            <a:r>
+              <a:rPr lang="en-US" sz="1100" dirty="0">
+                <a:solidFill>
+                  <a:srgbClr val="7030A0"/>
+                </a:solidFill>
+              </a:rPr>
+              <a:t>filtered list</a:t>
+            </a:r>
+            <a:endParaRPr lang="en-SG" sz="1100" dirty="0">
+              <a:solidFill>
+                <a:srgbClr val="7030A0"/>
+              </a:solidFill>
+            </a:endParaRPr>
+          </a:p>
+        </p:txBody>
+      </p:sp>
+      <p:sp>
+        <p:nvSpPr>
+          <p:cNvPr id="122" name="Rectangle 8"/>
           <p:cNvSpPr/>
           <p:nvPr/>
         </p:nvSpPr>
         <p:spPr>
           <a:xfrm>
-            <a:off x="1260922" y="1998350"/>
-            <a:ext cx="1443661" cy="364396"/>
+            <a:off x="1376636" y="5446326"/>
+            <a:ext cx="1066800" cy="346760"/>
           </a:xfrm>
           <a:prstGeom prst="rect">
             <a:avLst/>
@@ -4926,124 +4949,6 @@
                   <a:srgbClr val="7030A0"/>
                 </a:solidFill>
               </a:rPr>
-              <a:t>ReadOnlyAddressBook</a:t>
-            </a:r>
-            <a:endParaRPr lang="en-SG" sz="1050" dirty="0">
-              <a:solidFill>
-                <a:srgbClr val="7030A0"/>
-              </a:solidFill>
-            </a:endParaRPr>
-          </a:p>
-        </p:txBody>
-      </p:sp>
-      <p:sp>
-        <p:nvSpPr>
-          <p:cNvPr id="114" name="TextBox 113"/>
-          <p:cNvSpPr txBox="1"/>
-          <p:nvPr/>
-        </p:nvSpPr>
-        <p:spPr>
-          <a:xfrm rot="16200000">
-            <a:off x="6362886" y="3586305"/>
-            <a:ext cx="881018" cy="261610"/>
-          </a:xfrm>
-          <a:prstGeom prst="rect">
-            <a:avLst/>
-          </a:prstGeom>
-          <a:noFill/>
-        </p:spPr>
-        <p:txBody>
-          <a:bodyPr wrap="square" rtlCol="0">
-            <a:spAutoFit/>
-          </a:bodyPr>
-          <a:lstStyle/>
-          <a:p>
-            <a:pPr algn="r"/>
-            <a:r>
-              <a:rPr lang="en-US" sz="1100" dirty="0">
-                <a:solidFill>
-                  <a:srgbClr val="7030A0"/>
-                </a:solidFill>
-              </a:rPr>
-              <a:t>filtered list</a:t>
-            </a:r>
-            <a:endParaRPr lang="en-SG" sz="1100" dirty="0">
-              <a:solidFill>
-                <a:srgbClr val="7030A0"/>
-              </a:solidFill>
-            </a:endParaRPr>
-          </a:p>
-        </p:txBody>
-      </p:sp>
-      <p:sp>
-        <p:nvSpPr>
-          <p:cNvPr id="122" name="Rectangle 8"/>
-          <p:cNvSpPr/>
-          <p:nvPr/>
-        </p:nvSpPr>
-        <p:spPr>
-          <a:xfrm>
-            <a:off x="2057401" y="4239491"/>
-            <a:ext cx="1066800" cy="346760"/>
-          </a:xfrm>
-          <a:prstGeom prst="rect">
-            <a:avLst/>
-          </a:prstGeom>
-          <a:ln w="19050">
-            <a:solidFill>
-              <a:srgbClr val="7030A0"/>
-            </a:solidFill>
-          </a:ln>
-          <a:effectLst/>
-        </p:spPr>
-        <p:style>
-          <a:lnRef idx="1">
-            <a:schemeClr val="accent4"/>
-          </a:lnRef>
-          <a:fillRef idx="2">
-            <a:schemeClr val="accent4"/>
-          </a:fillRef>
-          <a:effectRef idx="1">
-            <a:schemeClr val="accent4"/>
-          </a:effectRef>
-          <a:fontRef idx="minor">
-            <a:schemeClr val="dk1"/>
-          </a:fontRef>
-        </p:style>
-        <p:txBody>
-          <a:bodyPr rtlCol="0" anchor="ctr"/>
-          <a:lstStyle/>
-          <a:p>
-            <a:pPr algn="ctr"/>
-            <a:r>
-              <a:rPr lang="en-US" sz="1050" dirty="0">
-                <a:solidFill>
-                  <a:srgbClr val="7030A0"/>
-                </a:solidFill>
-              </a:rPr>
-              <a:t>&lt;&lt;interface&gt;&gt;</a:t>
-            </a:r>
-            <a:r>
-              <a:rPr lang="en-US" sz="1050">
-                <a:solidFill>
-                  <a:srgbClr val="7030A0"/>
-                </a:solidFill>
-              </a:rPr>
-              <a:t/>
-            </a:r>
-            <a:br>
-              <a:rPr lang="en-US" sz="1050">
-                <a:solidFill>
-                  <a:srgbClr val="7030A0"/>
-                </a:solidFill>
-              </a:rPr>
-            </a:br>
-            <a:r>
-              <a:rPr lang="en-US" sz="1050" dirty="0" err="1">
-                <a:solidFill>
-                  <a:srgbClr val="7030A0"/>
-                </a:solidFill>
-              </a:rPr>
               <a:t>ObservableList</a:t>
             </a:r>
             <a:endParaRPr lang="en-SG" sz="1050" dirty="0">
@@ -5065,8 +4970,8 @@
         </p:nvCxnSpPr>
         <p:spPr>
           <a:xfrm rot="16200000" flipH="1">
-            <a:off x="1364475" y="3719944"/>
-            <a:ext cx="831471" cy="554381"/>
+            <a:off x="194229" y="4437299"/>
+            <a:ext cx="2038306" cy="326507"/>
           </a:xfrm>
           <a:prstGeom prst="bentConnector2">
             <a:avLst/>
@@ -5104,8 +5009,8 @@
         </p:nvSpPr>
         <p:spPr>
           <a:xfrm>
-            <a:off x="4429979" y="3111479"/>
-            <a:ext cx="189257" cy="178683"/>
+            <a:off x="4195309" y="4623493"/>
+            <a:ext cx="172052" cy="178683"/>
           </a:xfrm>
           <a:prstGeom prst="rect">
             <a:avLst/>
@@ -5143,7 +5048,7 @@
         </p:nvSpPr>
         <p:spPr>
           <a:xfrm>
-            <a:off x="6135256" y="3097917"/>
+            <a:off x="5911052" y="4705306"/>
             <a:ext cx="189257" cy="178683"/>
           </a:xfrm>
           <a:prstGeom prst="rect">
@@ -5182,7 +5087,7 @@
         </p:nvSpPr>
         <p:spPr>
           <a:xfrm>
-            <a:off x="2573394" y="2756715"/>
+            <a:off x="2120503" y="2756715"/>
             <a:ext cx="170110" cy="137542"/>
           </a:xfrm>
           <a:prstGeom prst="rect">
@@ -5221,7 +5126,7 @@
         </p:nvSpPr>
         <p:spPr>
           <a:xfrm>
-            <a:off x="2707070" y="3667737"/>
+            <a:off x="2254179" y="3667737"/>
             <a:ext cx="189257" cy="178683"/>
           </a:xfrm>
           <a:prstGeom prst="rect">
@@ -5260,7 +5165,7 @@
         </p:nvSpPr>
         <p:spPr>
           <a:xfrm>
-            <a:off x="6449896" y="3204826"/>
+            <a:off x="6596852" y="5029156"/>
             <a:ext cx="189257" cy="178683"/>
           </a:xfrm>
           <a:prstGeom prst="rect">
@@ -5305,8 +5210,8 @@
         </p:nvSpPr>
         <p:spPr>
           <a:xfrm>
-            <a:off x="7712397" y="2228817"/>
-            <a:ext cx="708186" cy="285783"/>
+            <a:off x="7601923" y="5333923"/>
+            <a:ext cx="1012984" cy="285783"/>
           </a:xfrm>
           <a:prstGeom prst="rect">
             <a:avLst/>
@@ -5370,9 +5275,9 @@
           <p:nvPr/>
         </p:nvCxnSpPr>
         <p:spPr>
-          <a:xfrm flipV="1">
-            <a:off x="7277995" y="2371709"/>
-            <a:ext cx="434402" cy="663182"/>
+          <a:xfrm>
+            <a:off x="7167521" y="4835643"/>
+            <a:ext cx="434402" cy="641172"/>
           </a:xfrm>
           <a:prstGeom prst="bentConnector3">
             <a:avLst>
@@ -5417,7 +5322,7 @@
         </p:nvSpPr>
         <p:spPr>
           <a:xfrm>
-            <a:off x="7466243" y="2255711"/>
+            <a:off x="7395709" y="5536317"/>
             <a:ext cx="189257" cy="178683"/>
           </a:xfrm>
           <a:prstGeom prst="rect">
@@ -5456,7 +5361,7 @@
         </p:nvSpPr>
         <p:spPr>
           <a:xfrm>
-            <a:off x="3170181" y="1998350"/>
+            <a:off x="2717290" y="1998350"/>
             <a:ext cx="1060683" cy="364396"/>
           </a:xfrm>
           <a:prstGeom prst="rect">
@@ -5489,12 +5394,12 @@
           <a:p>
             <a:pPr algn="ctr"/>
             <a:r>
-              <a:rPr lang="en-US" sz="1050" dirty="0" err="1">
+              <a:rPr lang="en-US" sz="1050" dirty="0">
                 <a:solidFill>
                   <a:srgbClr val="7030A0"/>
                 </a:solidFill>
               </a:rPr>
-              <a:t>AddressBook</a:t>
+              <a:t>Concierge</a:t>
             </a:r>
             <a:endParaRPr lang="en-SG" sz="1050" dirty="0">
               <a:solidFill>
@@ -5504,47 +5409,6 @@
           </a:p>
         </p:txBody>
       </p:sp>
-      <p:cxnSp>
-        <p:nvCxnSpPr>
-          <p:cNvPr id="60" name="Straight Arrow Connector 59"/>
-          <p:cNvCxnSpPr>
-            <a:stCxn id="51" idx="1"/>
-            <a:endCxn id="49" idx="1"/>
-          </p:cNvCxnSpPr>
-          <p:nvPr/>
-        </p:nvCxnSpPr>
-        <p:spPr>
-          <a:xfrm>
-            <a:off x="4324972" y="3007222"/>
-            <a:ext cx="367678" cy="12320"/>
-          </a:xfrm>
-          <a:prstGeom prst="straightConnector1">
-            <a:avLst/>
-          </a:prstGeom>
-          <a:ln w="19050">
-            <a:solidFill>
-              <a:srgbClr val="7030A0"/>
-            </a:solidFill>
-            <a:headEnd type="none" w="med" len="med"/>
-            <a:tailEnd type="arrow" w="med" len="med"/>
-          </a:ln>
-          <a:effectLst/>
-        </p:spPr>
-        <p:style>
-          <a:lnRef idx="1">
-            <a:schemeClr val="accent2"/>
-          </a:lnRef>
-          <a:fillRef idx="2">
-            <a:schemeClr val="accent2"/>
-          </a:fillRef>
-          <a:effectRef idx="1">
-            <a:schemeClr val="accent2"/>
-          </a:effectRef>
-          <a:fontRef idx="minor">
-            <a:schemeClr val="dk1"/>
-          </a:fontRef>
-        </p:style>
-      </p:cxnSp>
       <p:sp>
         <p:nvSpPr>
           <p:cNvPr id="68" name="Isosceles Triangle 102"/>
@@ -5553,7 +5417,7 @@
         </p:nvSpPr>
         <p:spPr>
           <a:xfrm rot="16200000">
-            <a:off x="2669073" y="2069158"/>
+            <a:off x="2216182" y="2069158"/>
             <a:ext cx="271014" cy="187417"/>
           </a:xfrm>
           <a:prstGeom prst="triangle">
@@ -5608,7 +5472,7 @@
         </p:nvCxnSpPr>
         <p:spPr>
           <a:xfrm>
-            <a:off x="2898289" y="2177727"/>
+            <a:off x="2445398" y="2177727"/>
             <a:ext cx="271892" cy="2821"/>
           </a:xfrm>
           <a:prstGeom prst="bentConnector3">
@@ -5623,6 +5487,1569 @@
             <a:prstDash val="sysDot"/>
             <a:headEnd type="none" w="med" len="med"/>
             <a:tailEnd type="none" w="med" len="med"/>
+          </a:ln>
+          <a:effectLst/>
+        </p:spPr>
+        <p:style>
+          <a:lnRef idx="1">
+            <a:schemeClr val="accent2"/>
+          </a:lnRef>
+          <a:fillRef idx="2">
+            <a:schemeClr val="accent2"/>
+          </a:fillRef>
+          <a:effectRef idx="1">
+            <a:schemeClr val="accent2"/>
+          </a:effectRef>
+          <a:fontRef idx="minor">
+            <a:schemeClr val="dk1"/>
+          </a:fontRef>
+        </p:style>
+      </p:cxnSp>
+      <p:cxnSp>
+        <p:nvCxnSpPr>
+          <p:cNvPr id="56" name="Elbow Connector 78">
+            <a:extLst>
+              <a:ext uri="{FF2B5EF4-FFF2-40B4-BE49-F238E27FC236}">
+                <a16:creationId xmlns:a16="http://schemas.microsoft.com/office/drawing/2014/main" id="{430BFC8B-DA02-416F-846F-44F3E7081AD4}"/>
+              </a:ext>
+            </a:extLst>
+          </p:cNvPr>
+          <p:cNvCxnSpPr>
+            <a:cxnSpLocks/>
+            <a:stCxn id="51" idx="3"/>
+            <a:endCxn id="49" idx="1"/>
+          </p:cNvCxnSpPr>
+          <p:nvPr/>
+        </p:nvCxnSpPr>
+        <p:spPr>
+          <a:xfrm>
+            <a:off x="4108129" y="3007222"/>
+            <a:ext cx="321647" cy="1840381"/>
+          </a:xfrm>
+          <a:prstGeom prst="bentConnector3">
+            <a:avLst>
+              <a:gd name="adj1" fmla="val 18413"/>
+            </a:avLst>
+          </a:prstGeom>
+          <a:ln w="19050">
+            <a:solidFill>
+              <a:srgbClr val="7030A0"/>
+            </a:solidFill>
+            <a:headEnd type="none" w="med" len="med"/>
+            <a:tailEnd type="arrow" w="med" len="med"/>
+          </a:ln>
+          <a:effectLst/>
+        </p:spPr>
+        <p:style>
+          <a:lnRef idx="1">
+            <a:schemeClr val="accent2"/>
+          </a:lnRef>
+          <a:fillRef idx="2">
+            <a:schemeClr val="accent2"/>
+          </a:fillRef>
+          <a:effectRef idx="1">
+            <a:schemeClr val="accent2"/>
+          </a:effectRef>
+          <a:fontRef idx="minor">
+            <a:schemeClr val="dk1"/>
+          </a:fontRef>
+        </p:style>
+      </p:cxnSp>
+      <p:sp>
+        <p:nvSpPr>
+          <p:cNvPr id="57" name="Rectangle 8">
+            <a:extLst>
+              <a:ext uri="{FF2B5EF4-FFF2-40B4-BE49-F238E27FC236}">
+                <a16:creationId xmlns:a16="http://schemas.microsoft.com/office/drawing/2014/main" id="{435B58AE-877E-4647-AC46-F762A7D245DD}"/>
+              </a:ext>
+            </a:extLst>
+          </p:cNvPr>
+          <p:cNvSpPr/>
+          <p:nvPr/>
+        </p:nvSpPr>
+        <p:spPr>
+          <a:xfrm>
+            <a:off x="4429775" y="3292742"/>
+            <a:ext cx="1156969" cy="346760"/>
+          </a:xfrm>
+          <a:prstGeom prst="rect">
+            <a:avLst/>
+          </a:prstGeom>
+          <a:ln w="19050">
+            <a:solidFill>
+              <a:srgbClr val="7030A0"/>
+            </a:solidFill>
+          </a:ln>
+          <a:effectLst/>
+        </p:spPr>
+        <p:style>
+          <a:lnRef idx="1">
+            <a:schemeClr val="accent4"/>
+          </a:lnRef>
+          <a:fillRef idx="2">
+            <a:schemeClr val="accent4"/>
+          </a:fillRef>
+          <a:effectRef idx="1">
+            <a:schemeClr val="accent4"/>
+          </a:effectRef>
+          <a:fontRef idx="minor">
+            <a:schemeClr val="dk1"/>
+          </a:fontRef>
+        </p:style>
+        <p:txBody>
+          <a:bodyPr rtlCol="0" anchor="ctr"/>
+          <a:lstStyle/>
+          <a:p>
+            <a:pPr algn="ctr"/>
+            <a:r>
+              <a:rPr lang="en-US" sz="1050" dirty="0" err="1">
+                <a:solidFill>
+                  <a:srgbClr val="7030A0"/>
+                </a:solidFill>
+              </a:rPr>
+              <a:t>UniqueRoomList</a:t>
+            </a:r>
+            <a:endParaRPr lang="en-SG" sz="1050" dirty="0">
+              <a:solidFill>
+                <a:srgbClr val="7030A0"/>
+              </a:solidFill>
+            </a:endParaRPr>
+          </a:p>
+        </p:txBody>
+      </p:sp>
+      <p:cxnSp>
+        <p:nvCxnSpPr>
+          <p:cNvPr id="67" name="Elbow Connector 78">
+            <a:extLst>
+              <a:ext uri="{FF2B5EF4-FFF2-40B4-BE49-F238E27FC236}">
+                <a16:creationId xmlns:a16="http://schemas.microsoft.com/office/drawing/2014/main" id="{3D132F78-E7CB-4BEE-B43A-010D1F69DB18}"/>
+              </a:ext>
+            </a:extLst>
+          </p:cNvPr>
+          <p:cNvCxnSpPr>
+            <a:cxnSpLocks/>
+            <a:stCxn id="51" idx="3"/>
+            <a:endCxn id="57" idx="1"/>
+          </p:cNvCxnSpPr>
+          <p:nvPr/>
+        </p:nvCxnSpPr>
+        <p:spPr>
+          <a:xfrm>
+            <a:off x="4108129" y="3007222"/>
+            <a:ext cx="321646" cy="458900"/>
+          </a:xfrm>
+          <a:prstGeom prst="bentConnector3">
+            <a:avLst>
+              <a:gd name="adj1" fmla="val 19222"/>
+            </a:avLst>
+          </a:prstGeom>
+          <a:ln w="19050">
+            <a:solidFill>
+              <a:srgbClr val="7030A0"/>
+            </a:solidFill>
+            <a:headEnd type="none" w="med" len="med"/>
+            <a:tailEnd type="arrow" w="med" len="med"/>
+          </a:ln>
+          <a:effectLst/>
+        </p:spPr>
+        <p:style>
+          <a:lnRef idx="1">
+            <a:schemeClr val="accent2"/>
+          </a:lnRef>
+          <a:fillRef idx="2">
+            <a:schemeClr val="accent2"/>
+          </a:fillRef>
+          <a:effectRef idx="1">
+            <a:schemeClr val="accent2"/>
+          </a:effectRef>
+          <a:fontRef idx="minor">
+            <a:schemeClr val="dk1"/>
+          </a:fontRef>
+        </p:style>
+      </p:cxnSp>
+      <p:sp>
+        <p:nvSpPr>
+          <p:cNvPr id="71" name="TextBox 70">
+            <a:extLst>
+              <a:ext uri="{FF2B5EF4-FFF2-40B4-BE49-F238E27FC236}">
+                <a16:creationId xmlns:a16="http://schemas.microsoft.com/office/drawing/2014/main" id="{02BC98B3-5047-49C1-AC64-D3764A244BA4}"/>
+              </a:ext>
+            </a:extLst>
+          </p:cNvPr>
+          <p:cNvSpPr txBox="1"/>
+          <p:nvPr/>
+        </p:nvSpPr>
+        <p:spPr>
+          <a:xfrm>
+            <a:off x="4191076" y="3241558"/>
+            <a:ext cx="172052" cy="178683"/>
+          </a:xfrm>
+          <a:prstGeom prst="rect">
+            <a:avLst/>
+          </a:prstGeom>
+          <a:noFill/>
+        </p:spPr>
+        <p:txBody>
+          <a:bodyPr wrap="square" lIns="0" tIns="0" rIns="0" bIns="0" rtlCol="0">
+            <a:noAutofit/>
+          </a:bodyPr>
+          <a:lstStyle/>
+          <a:p>
+            <a:pPr algn="ctr"/>
+            <a:r>
+              <a:rPr lang="en-US" sz="1100" dirty="0">
+                <a:solidFill>
+                  <a:srgbClr val="7030A0"/>
+                </a:solidFill>
+              </a:rPr>
+              <a:t>1</a:t>
+            </a:r>
+            <a:endParaRPr lang="en-SG" sz="1100" dirty="0">
+              <a:solidFill>
+                <a:srgbClr val="7030A0"/>
+              </a:solidFill>
+            </a:endParaRPr>
+          </a:p>
+        </p:txBody>
+      </p:sp>
+      <p:sp>
+        <p:nvSpPr>
+          <p:cNvPr id="72" name="Rectangle 8">
+            <a:extLst>
+              <a:ext uri="{FF2B5EF4-FFF2-40B4-BE49-F238E27FC236}">
+                <a16:creationId xmlns:a16="http://schemas.microsoft.com/office/drawing/2014/main" id="{EF7296E9-9601-4FC3-BD9A-CC815C4EC065}"/>
+              </a:ext>
+            </a:extLst>
+          </p:cNvPr>
+          <p:cNvSpPr/>
+          <p:nvPr/>
+        </p:nvSpPr>
+        <p:spPr>
+          <a:xfrm>
+            <a:off x="6203203" y="3283789"/>
+            <a:ext cx="708186" cy="346760"/>
+          </a:xfrm>
+          <a:prstGeom prst="rect">
+            <a:avLst/>
+          </a:prstGeom>
+          <a:ln w="19050">
+            <a:solidFill>
+              <a:srgbClr val="7030A0"/>
+            </a:solidFill>
+          </a:ln>
+          <a:effectLst/>
+        </p:spPr>
+        <p:style>
+          <a:lnRef idx="1">
+            <a:schemeClr val="accent4"/>
+          </a:lnRef>
+          <a:fillRef idx="2">
+            <a:schemeClr val="accent4"/>
+          </a:fillRef>
+          <a:effectRef idx="1">
+            <a:schemeClr val="accent4"/>
+          </a:effectRef>
+          <a:fontRef idx="minor">
+            <a:schemeClr val="dk1"/>
+          </a:fontRef>
+        </p:style>
+        <p:txBody>
+          <a:bodyPr rtlCol="0" anchor="ctr"/>
+          <a:lstStyle/>
+          <a:p>
+            <a:pPr algn="ctr"/>
+            <a:r>
+              <a:rPr lang="en-US" sz="1050" dirty="0">
+                <a:solidFill>
+                  <a:srgbClr val="7030A0"/>
+                </a:solidFill>
+              </a:rPr>
+              <a:t>Room</a:t>
+            </a:r>
+            <a:endParaRPr lang="en-SG" sz="1050" dirty="0">
+              <a:solidFill>
+                <a:srgbClr val="7030A0"/>
+              </a:solidFill>
+            </a:endParaRPr>
+          </a:p>
+        </p:txBody>
+      </p:sp>
+      <p:sp>
+        <p:nvSpPr>
+          <p:cNvPr id="73" name="Flowchart: Decision 96">
+            <a:extLst>
+              <a:ext uri="{FF2B5EF4-FFF2-40B4-BE49-F238E27FC236}">
+                <a16:creationId xmlns:a16="http://schemas.microsoft.com/office/drawing/2014/main" id="{EB155D0C-8260-42F1-9367-64E9922424D9}"/>
+              </a:ext>
+            </a:extLst>
+          </p:cNvPr>
+          <p:cNvSpPr/>
+          <p:nvPr/>
+        </p:nvSpPr>
+        <p:spPr>
+          <a:xfrm>
+            <a:off x="5598281" y="3376266"/>
+            <a:ext cx="236048" cy="173380"/>
+          </a:xfrm>
+          <a:prstGeom prst="flowChartDecision">
+            <a:avLst/>
+          </a:prstGeom>
+          <a:noFill/>
+          <a:ln w="19050">
+            <a:solidFill>
+              <a:srgbClr val="7030A0"/>
+            </a:solidFill>
+          </a:ln>
+          <a:effectLst/>
+        </p:spPr>
+        <p:style>
+          <a:lnRef idx="1">
+            <a:schemeClr val="accent6"/>
+          </a:lnRef>
+          <a:fillRef idx="2">
+            <a:schemeClr val="accent6"/>
+          </a:fillRef>
+          <a:effectRef idx="1">
+            <a:schemeClr val="accent6"/>
+          </a:effectRef>
+          <a:fontRef idx="minor">
+            <a:schemeClr val="dk1"/>
+          </a:fontRef>
+        </p:style>
+        <p:txBody>
+          <a:bodyPr rtlCol="0" anchor="ctr"/>
+          <a:lstStyle/>
+          <a:p>
+            <a:pPr algn="ctr"/>
+            <a:endParaRPr lang="en-US" sz="1050"/>
+          </a:p>
+        </p:txBody>
+      </p:sp>
+      <p:cxnSp>
+        <p:nvCxnSpPr>
+          <p:cNvPr id="74" name="Elbow Connector 63">
+            <a:extLst>
+              <a:ext uri="{FF2B5EF4-FFF2-40B4-BE49-F238E27FC236}">
+                <a16:creationId xmlns:a16="http://schemas.microsoft.com/office/drawing/2014/main" id="{CC16F32B-95A9-4A39-BA3C-76BC3C3902D1}"/>
+              </a:ext>
+            </a:extLst>
+          </p:cNvPr>
+          <p:cNvCxnSpPr>
+            <a:stCxn id="73" idx="3"/>
+            <a:endCxn id="72" idx="1"/>
+          </p:cNvCxnSpPr>
+          <p:nvPr/>
+        </p:nvCxnSpPr>
+        <p:spPr>
+          <a:xfrm flipV="1">
+            <a:off x="5834329" y="3457169"/>
+            <a:ext cx="368874" cy="5787"/>
+          </a:xfrm>
+          <a:prstGeom prst="bentConnector3">
+            <a:avLst/>
+          </a:prstGeom>
+          <a:ln w="19050">
+            <a:solidFill>
+              <a:srgbClr val="7030A0"/>
+            </a:solidFill>
+            <a:headEnd type="none" w="med" len="med"/>
+            <a:tailEnd type="arrow" w="med" len="med"/>
+          </a:ln>
+          <a:effectLst/>
+        </p:spPr>
+        <p:style>
+          <a:lnRef idx="1">
+            <a:schemeClr val="accent2"/>
+          </a:lnRef>
+          <a:fillRef idx="2">
+            <a:schemeClr val="accent2"/>
+          </a:fillRef>
+          <a:effectRef idx="1">
+            <a:schemeClr val="accent2"/>
+          </a:effectRef>
+          <a:fontRef idx="minor">
+            <a:schemeClr val="dk1"/>
+          </a:fontRef>
+        </p:style>
+      </p:cxnSp>
+      <p:sp>
+        <p:nvSpPr>
+          <p:cNvPr id="77" name="TextBox 76">
+            <a:extLst>
+              <a:ext uri="{FF2B5EF4-FFF2-40B4-BE49-F238E27FC236}">
+                <a16:creationId xmlns:a16="http://schemas.microsoft.com/office/drawing/2014/main" id="{FF0DF3C6-FD1F-4BB3-9B56-529011DEF4B5}"/>
+              </a:ext>
+            </a:extLst>
+          </p:cNvPr>
+          <p:cNvSpPr txBox="1"/>
+          <p:nvPr/>
+        </p:nvSpPr>
+        <p:spPr>
+          <a:xfrm>
+            <a:off x="5911052" y="3295028"/>
+            <a:ext cx="189257" cy="178683"/>
+          </a:xfrm>
+          <a:prstGeom prst="rect">
+            <a:avLst/>
+          </a:prstGeom>
+          <a:noFill/>
+        </p:spPr>
+        <p:txBody>
+          <a:bodyPr wrap="square" lIns="0" tIns="0" rIns="0" bIns="0" rtlCol="0">
+            <a:noAutofit/>
+          </a:bodyPr>
+          <a:lstStyle/>
+          <a:p>
+            <a:pPr algn="ctr"/>
+            <a:r>
+              <a:rPr lang="en-US" sz="1100" dirty="0">
+                <a:solidFill>
+                  <a:srgbClr val="7030A0"/>
+                </a:solidFill>
+              </a:rPr>
+              <a:t>*</a:t>
+            </a:r>
+            <a:endParaRPr lang="en-SG" sz="1100" dirty="0">
+              <a:solidFill>
+                <a:srgbClr val="7030A0"/>
+              </a:solidFill>
+            </a:endParaRPr>
+          </a:p>
+        </p:txBody>
+      </p:sp>
+      <p:sp>
+        <p:nvSpPr>
+          <p:cNvPr id="82" name="Rectangle 8">
+            <a:extLst>
+              <a:ext uri="{FF2B5EF4-FFF2-40B4-BE49-F238E27FC236}">
+                <a16:creationId xmlns:a16="http://schemas.microsoft.com/office/drawing/2014/main" id="{FE16C8D3-2675-4408-9A14-D2984577EEDF}"/>
+              </a:ext>
+            </a:extLst>
+          </p:cNvPr>
+          <p:cNvSpPr/>
+          <p:nvPr/>
+        </p:nvSpPr>
+        <p:spPr>
+          <a:xfrm>
+            <a:off x="7601923" y="2993390"/>
+            <a:ext cx="1012986" cy="285783"/>
+          </a:xfrm>
+          <a:prstGeom prst="rect">
+            <a:avLst/>
+          </a:prstGeom>
+          <a:ln w="19050">
+            <a:solidFill>
+              <a:srgbClr val="7030A0"/>
+            </a:solidFill>
+          </a:ln>
+          <a:effectLst/>
+        </p:spPr>
+        <p:style>
+          <a:lnRef idx="1">
+            <a:schemeClr val="accent4"/>
+          </a:lnRef>
+          <a:fillRef idx="2">
+            <a:schemeClr val="accent4"/>
+          </a:fillRef>
+          <a:effectRef idx="1">
+            <a:schemeClr val="accent4"/>
+          </a:effectRef>
+          <a:fontRef idx="minor">
+            <a:schemeClr val="dk1"/>
+          </a:fontRef>
+        </p:style>
+        <p:txBody>
+          <a:bodyPr rtlCol="0" anchor="ctr"/>
+          <a:lstStyle/>
+          <a:p>
+            <a:pPr algn="ctr"/>
+            <a:r>
+              <a:rPr lang="en-US" sz="1050" dirty="0">
+                <a:solidFill>
+                  <a:srgbClr val="7030A0"/>
+                </a:solidFill>
+              </a:rPr>
+              <a:t>Capacity</a:t>
+            </a:r>
+            <a:endParaRPr lang="en-SG" sz="1050" dirty="0">
+              <a:solidFill>
+                <a:srgbClr val="7030A0"/>
+              </a:solidFill>
+            </a:endParaRPr>
+          </a:p>
+        </p:txBody>
+      </p:sp>
+      <p:sp>
+        <p:nvSpPr>
+          <p:cNvPr id="87" name="Flowchart: Decision 96">
+            <a:extLst>
+              <a:ext uri="{FF2B5EF4-FFF2-40B4-BE49-F238E27FC236}">
+                <a16:creationId xmlns:a16="http://schemas.microsoft.com/office/drawing/2014/main" id="{74C35927-F8D9-4B5A-B7ED-AF86431BED91}"/>
+              </a:ext>
+            </a:extLst>
+          </p:cNvPr>
+          <p:cNvSpPr/>
+          <p:nvPr/>
+        </p:nvSpPr>
+        <p:spPr>
+          <a:xfrm>
+            <a:off x="6931473" y="3377353"/>
+            <a:ext cx="236048" cy="173380"/>
+          </a:xfrm>
+          <a:prstGeom prst="flowChartDecision">
+            <a:avLst/>
+          </a:prstGeom>
+          <a:solidFill>
+            <a:srgbClr val="7030A0"/>
+          </a:solidFill>
+          <a:ln w="19050">
+            <a:solidFill>
+              <a:srgbClr val="7030A0"/>
+            </a:solidFill>
+          </a:ln>
+          <a:effectLst/>
+        </p:spPr>
+        <p:style>
+          <a:lnRef idx="1">
+            <a:schemeClr val="accent6"/>
+          </a:lnRef>
+          <a:fillRef idx="2">
+            <a:schemeClr val="accent6"/>
+          </a:fillRef>
+          <a:effectRef idx="1">
+            <a:schemeClr val="accent6"/>
+          </a:effectRef>
+          <a:fontRef idx="minor">
+            <a:schemeClr val="dk1"/>
+          </a:fontRef>
+        </p:style>
+        <p:txBody>
+          <a:bodyPr rtlCol="0" anchor="ctr"/>
+          <a:lstStyle/>
+          <a:p>
+            <a:pPr algn="ctr"/>
+            <a:endParaRPr lang="en-US" sz="1050"/>
+          </a:p>
+        </p:txBody>
+      </p:sp>
+      <p:cxnSp>
+        <p:nvCxnSpPr>
+          <p:cNvPr id="88" name="Elbow Connector 78">
+            <a:extLst>
+              <a:ext uri="{FF2B5EF4-FFF2-40B4-BE49-F238E27FC236}">
+                <a16:creationId xmlns:a16="http://schemas.microsoft.com/office/drawing/2014/main" id="{E6597AD5-33F8-46B5-A25D-2666B9A65A25}"/>
+              </a:ext>
+            </a:extLst>
+          </p:cNvPr>
+          <p:cNvCxnSpPr>
+            <a:cxnSpLocks/>
+          </p:cNvCxnSpPr>
+          <p:nvPr/>
+        </p:nvCxnSpPr>
+        <p:spPr>
+          <a:xfrm flipV="1">
+            <a:off x="7167521" y="3135973"/>
+            <a:ext cx="434402" cy="327761"/>
+          </a:xfrm>
+          <a:prstGeom prst="bentConnector3">
+            <a:avLst/>
+          </a:prstGeom>
+          <a:ln w="19050">
+            <a:solidFill>
+              <a:srgbClr val="7030A0"/>
+            </a:solidFill>
+            <a:headEnd type="none" w="med" len="med"/>
+            <a:tailEnd type="arrow" w="med" len="med"/>
+          </a:ln>
+          <a:effectLst/>
+        </p:spPr>
+        <p:style>
+          <a:lnRef idx="1">
+            <a:schemeClr val="accent2"/>
+          </a:lnRef>
+          <a:fillRef idx="2">
+            <a:schemeClr val="accent2"/>
+          </a:fillRef>
+          <a:effectRef idx="1">
+            <a:schemeClr val="accent2"/>
+          </a:effectRef>
+          <a:fontRef idx="minor">
+            <a:schemeClr val="dk1"/>
+          </a:fontRef>
+        </p:style>
+      </p:cxnSp>
+      <p:sp>
+        <p:nvSpPr>
+          <p:cNvPr id="89" name="Rectangle 8">
+            <a:extLst>
+              <a:ext uri="{FF2B5EF4-FFF2-40B4-BE49-F238E27FC236}">
+                <a16:creationId xmlns:a16="http://schemas.microsoft.com/office/drawing/2014/main" id="{CF32A7D2-6385-4297-ACE7-449811E6D213}"/>
+              </a:ext>
+            </a:extLst>
+          </p:cNvPr>
+          <p:cNvSpPr/>
+          <p:nvPr/>
+        </p:nvSpPr>
+        <p:spPr>
+          <a:xfrm>
+            <a:off x="7601922" y="3316368"/>
+            <a:ext cx="1012985" cy="285783"/>
+          </a:xfrm>
+          <a:prstGeom prst="rect">
+            <a:avLst/>
+          </a:prstGeom>
+          <a:ln w="19050">
+            <a:solidFill>
+              <a:srgbClr val="7030A0"/>
+            </a:solidFill>
+          </a:ln>
+          <a:effectLst/>
+        </p:spPr>
+        <p:style>
+          <a:lnRef idx="1">
+            <a:schemeClr val="accent4"/>
+          </a:lnRef>
+          <a:fillRef idx="2">
+            <a:schemeClr val="accent4"/>
+          </a:fillRef>
+          <a:effectRef idx="1">
+            <a:schemeClr val="accent4"/>
+          </a:effectRef>
+          <a:fontRef idx="minor">
+            <a:schemeClr val="dk1"/>
+          </a:fontRef>
+        </p:style>
+        <p:txBody>
+          <a:bodyPr rtlCol="0" anchor="ctr"/>
+          <a:lstStyle/>
+          <a:p>
+            <a:pPr algn="ctr"/>
+            <a:r>
+              <a:rPr lang="en-US" sz="1050" dirty="0">
+                <a:solidFill>
+                  <a:srgbClr val="7030A0"/>
+                </a:solidFill>
+              </a:rPr>
+              <a:t>Expenses</a:t>
+            </a:r>
+            <a:endParaRPr lang="en-SG" sz="1050" dirty="0">
+              <a:solidFill>
+                <a:srgbClr val="7030A0"/>
+              </a:solidFill>
+            </a:endParaRPr>
+          </a:p>
+        </p:txBody>
+      </p:sp>
+      <p:cxnSp>
+        <p:nvCxnSpPr>
+          <p:cNvPr id="90" name="Elbow Connector 80">
+            <a:extLst>
+              <a:ext uri="{FF2B5EF4-FFF2-40B4-BE49-F238E27FC236}">
+                <a16:creationId xmlns:a16="http://schemas.microsoft.com/office/drawing/2014/main" id="{D56FBDC8-3E1D-4A86-9AD2-3AE3C20CED5E}"/>
+              </a:ext>
+            </a:extLst>
+          </p:cNvPr>
+          <p:cNvCxnSpPr>
+            <a:cxnSpLocks/>
+            <a:stCxn id="87" idx="3"/>
+            <a:endCxn id="89" idx="1"/>
+          </p:cNvCxnSpPr>
+          <p:nvPr/>
+        </p:nvCxnSpPr>
+        <p:spPr>
+          <a:xfrm flipV="1">
+            <a:off x="7167521" y="3459260"/>
+            <a:ext cx="434401" cy="4783"/>
+          </a:xfrm>
+          <a:prstGeom prst="bentConnector3">
+            <a:avLst/>
+          </a:prstGeom>
+          <a:ln w="19050">
+            <a:solidFill>
+              <a:srgbClr val="7030A0"/>
+            </a:solidFill>
+            <a:headEnd type="none" w="med" len="med"/>
+            <a:tailEnd type="arrow" w="med" len="med"/>
+          </a:ln>
+          <a:effectLst/>
+        </p:spPr>
+        <p:style>
+          <a:lnRef idx="1">
+            <a:schemeClr val="accent2"/>
+          </a:lnRef>
+          <a:fillRef idx="2">
+            <a:schemeClr val="accent2"/>
+          </a:fillRef>
+          <a:effectRef idx="1">
+            <a:schemeClr val="accent2"/>
+          </a:effectRef>
+          <a:fontRef idx="minor">
+            <a:schemeClr val="dk1"/>
+          </a:fontRef>
+        </p:style>
+      </p:cxnSp>
+      <p:sp>
+        <p:nvSpPr>
+          <p:cNvPr id="91" name="Rectangle 8">
+            <a:extLst>
+              <a:ext uri="{FF2B5EF4-FFF2-40B4-BE49-F238E27FC236}">
+                <a16:creationId xmlns:a16="http://schemas.microsoft.com/office/drawing/2014/main" id="{49A49450-8F2B-406F-9257-8B2F08A5C854}"/>
+              </a:ext>
+            </a:extLst>
+          </p:cNvPr>
+          <p:cNvSpPr/>
+          <p:nvPr/>
+        </p:nvSpPr>
+        <p:spPr>
+          <a:xfrm>
+            <a:off x="7601923" y="3639346"/>
+            <a:ext cx="1012984" cy="285783"/>
+          </a:xfrm>
+          <a:prstGeom prst="rect">
+            <a:avLst/>
+          </a:prstGeom>
+          <a:ln w="19050">
+            <a:solidFill>
+              <a:srgbClr val="7030A0"/>
+            </a:solidFill>
+          </a:ln>
+          <a:effectLst/>
+        </p:spPr>
+        <p:style>
+          <a:lnRef idx="1">
+            <a:schemeClr val="accent4"/>
+          </a:lnRef>
+          <a:fillRef idx="2">
+            <a:schemeClr val="accent4"/>
+          </a:fillRef>
+          <a:effectRef idx="1">
+            <a:schemeClr val="accent4"/>
+          </a:effectRef>
+          <a:fontRef idx="minor">
+            <a:schemeClr val="dk1"/>
+          </a:fontRef>
+        </p:style>
+        <p:txBody>
+          <a:bodyPr rtlCol="0" anchor="ctr"/>
+          <a:lstStyle/>
+          <a:p>
+            <a:pPr algn="ctr"/>
+            <a:r>
+              <a:rPr lang="en-US" sz="1050" dirty="0">
+                <a:solidFill>
+                  <a:srgbClr val="7030A0"/>
+                </a:solidFill>
+              </a:rPr>
+              <a:t>Bookings</a:t>
+            </a:r>
+            <a:endParaRPr lang="en-SG" sz="1050" dirty="0">
+              <a:solidFill>
+                <a:srgbClr val="7030A0"/>
+              </a:solidFill>
+            </a:endParaRPr>
+          </a:p>
+        </p:txBody>
+      </p:sp>
+      <p:cxnSp>
+        <p:nvCxnSpPr>
+          <p:cNvPr id="92" name="Elbow Connector 83">
+            <a:extLst>
+              <a:ext uri="{FF2B5EF4-FFF2-40B4-BE49-F238E27FC236}">
+                <a16:creationId xmlns:a16="http://schemas.microsoft.com/office/drawing/2014/main" id="{E7833904-D6A6-4F98-ABB1-9712D08D89C3}"/>
+              </a:ext>
+            </a:extLst>
+          </p:cNvPr>
+          <p:cNvCxnSpPr>
+            <a:cxnSpLocks/>
+            <a:stCxn id="87" idx="3"/>
+            <a:endCxn id="91" idx="1"/>
+          </p:cNvCxnSpPr>
+          <p:nvPr/>
+        </p:nvCxnSpPr>
+        <p:spPr>
+          <a:xfrm>
+            <a:off x="7167521" y="3464043"/>
+            <a:ext cx="434402" cy="318195"/>
+          </a:xfrm>
+          <a:prstGeom prst="bentConnector3">
+            <a:avLst/>
+          </a:prstGeom>
+          <a:ln w="19050">
+            <a:solidFill>
+              <a:srgbClr val="7030A0"/>
+            </a:solidFill>
+            <a:headEnd type="none" w="med" len="med"/>
+            <a:tailEnd type="arrow" w="med" len="med"/>
+          </a:ln>
+          <a:effectLst/>
+        </p:spPr>
+        <p:style>
+          <a:lnRef idx="1">
+            <a:schemeClr val="accent2"/>
+          </a:lnRef>
+          <a:fillRef idx="2">
+            <a:schemeClr val="accent2"/>
+          </a:fillRef>
+          <a:effectRef idx="1">
+            <a:schemeClr val="accent2"/>
+          </a:effectRef>
+          <a:fontRef idx="minor">
+            <a:schemeClr val="dk1"/>
+          </a:fontRef>
+        </p:style>
+      </p:cxnSp>
+      <p:sp>
+        <p:nvSpPr>
+          <p:cNvPr id="93" name="Rectangle 8">
+            <a:extLst>
+              <a:ext uri="{FF2B5EF4-FFF2-40B4-BE49-F238E27FC236}">
+                <a16:creationId xmlns:a16="http://schemas.microsoft.com/office/drawing/2014/main" id="{4512DC5C-0712-4B83-BE68-110ED7A91C0B}"/>
+              </a:ext>
+            </a:extLst>
+          </p:cNvPr>
+          <p:cNvSpPr/>
+          <p:nvPr/>
+        </p:nvSpPr>
+        <p:spPr>
+          <a:xfrm>
+            <a:off x="7601923" y="3962323"/>
+            <a:ext cx="1012984" cy="285783"/>
+          </a:xfrm>
+          <a:prstGeom prst="rect">
+            <a:avLst/>
+          </a:prstGeom>
+          <a:ln w="19050">
+            <a:solidFill>
+              <a:srgbClr val="7030A0"/>
+            </a:solidFill>
+          </a:ln>
+          <a:effectLst/>
+        </p:spPr>
+        <p:style>
+          <a:lnRef idx="1">
+            <a:schemeClr val="accent4"/>
+          </a:lnRef>
+          <a:fillRef idx="2">
+            <a:schemeClr val="accent4"/>
+          </a:fillRef>
+          <a:effectRef idx="1">
+            <a:schemeClr val="accent4"/>
+          </a:effectRef>
+          <a:fontRef idx="minor">
+            <a:schemeClr val="dk1"/>
+          </a:fontRef>
+        </p:style>
+        <p:txBody>
+          <a:bodyPr rtlCol="0" anchor="ctr"/>
+          <a:lstStyle/>
+          <a:p>
+            <a:pPr algn="ctr"/>
+            <a:r>
+              <a:rPr lang="en-US" sz="1050" dirty="0">
+                <a:solidFill>
+                  <a:srgbClr val="7030A0"/>
+                </a:solidFill>
+              </a:rPr>
+              <a:t>Tag</a:t>
+            </a:r>
+            <a:endParaRPr lang="en-SG" sz="1050" dirty="0">
+              <a:solidFill>
+                <a:srgbClr val="7030A0"/>
+              </a:solidFill>
+            </a:endParaRPr>
+          </a:p>
+        </p:txBody>
+      </p:sp>
+      <p:cxnSp>
+        <p:nvCxnSpPr>
+          <p:cNvPr id="94" name="Elbow Connector 78">
+            <a:extLst>
+              <a:ext uri="{FF2B5EF4-FFF2-40B4-BE49-F238E27FC236}">
+                <a16:creationId xmlns:a16="http://schemas.microsoft.com/office/drawing/2014/main" id="{9411D080-8BCA-4DCA-94CC-77F4C165A885}"/>
+              </a:ext>
+            </a:extLst>
+          </p:cNvPr>
+          <p:cNvCxnSpPr>
+            <a:cxnSpLocks/>
+            <a:stCxn id="87" idx="3"/>
+            <a:endCxn id="93" idx="1"/>
+          </p:cNvCxnSpPr>
+          <p:nvPr/>
+        </p:nvCxnSpPr>
+        <p:spPr>
+          <a:xfrm>
+            <a:off x="7167521" y="3464043"/>
+            <a:ext cx="434402" cy="641172"/>
+          </a:xfrm>
+          <a:prstGeom prst="bentConnector3">
+            <a:avLst>
+              <a:gd name="adj1" fmla="val 50000"/>
+            </a:avLst>
+          </a:prstGeom>
+          <a:ln w="19050">
+            <a:solidFill>
+              <a:srgbClr val="7030A0"/>
+            </a:solidFill>
+            <a:headEnd type="none" w="med" len="med"/>
+            <a:tailEnd type="arrow" w="med" len="med"/>
+          </a:ln>
+          <a:effectLst/>
+        </p:spPr>
+        <p:style>
+          <a:lnRef idx="1">
+            <a:schemeClr val="accent2"/>
+          </a:lnRef>
+          <a:fillRef idx="2">
+            <a:schemeClr val="accent2"/>
+          </a:fillRef>
+          <a:effectRef idx="1">
+            <a:schemeClr val="accent2"/>
+          </a:effectRef>
+          <a:fontRef idx="minor">
+            <a:schemeClr val="dk1"/>
+          </a:fontRef>
+        </p:style>
+      </p:cxnSp>
+      <p:sp>
+        <p:nvSpPr>
+          <p:cNvPr id="95" name="TextBox 94">
+            <a:extLst>
+              <a:ext uri="{FF2B5EF4-FFF2-40B4-BE49-F238E27FC236}">
+                <a16:creationId xmlns:a16="http://schemas.microsoft.com/office/drawing/2014/main" id="{EA18F87E-1E66-42EF-85F3-83C7FE4E23EA}"/>
+              </a:ext>
+            </a:extLst>
+          </p:cNvPr>
+          <p:cNvSpPr txBox="1"/>
+          <p:nvPr/>
+        </p:nvSpPr>
+        <p:spPr>
+          <a:xfrm>
+            <a:off x="7395709" y="4171906"/>
+            <a:ext cx="189257" cy="178683"/>
+          </a:xfrm>
+          <a:prstGeom prst="rect">
+            <a:avLst/>
+          </a:prstGeom>
+          <a:noFill/>
+        </p:spPr>
+        <p:txBody>
+          <a:bodyPr wrap="square" lIns="0" tIns="0" rIns="0" bIns="0" rtlCol="0">
+            <a:noAutofit/>
+          </a:bodyPr>
+          <a:lstStyle/>
+          <a:p>
+            <a:pPr algn="ctr"/>
+            <a:r>
+              <a:rPr lang="en-US" sz="1100" dirty="0">
+                <a:solidFill>
+                  <a:srgbClr val="7030A0"/>
+                </a:solidFill>
+              </a:rPr>
+              <a:t>*</a:t>
+            </a:r>
+            <a:endParaRPr lang="en-SG" sz="1100" dirty="0">
+              <a:solidFill>
+                <a:srgbClr val="7030A0"/>
+              </a:solidFill>
+            </a:endParaRPr>
+          </a:p>
+        </p:txBody>
+      </p:sp>
+      <p:sp>
+        <p:nvSpPr>
+          <p:cNvPr id="96" name="Rectangle 8">
+            <a:extLst>
+              <a:ext uri="{FF2B5EF4-FFF2-40B4-BE49-F238E27FC236}">
+                <a16:creationId xmlns:a16="http://schemas.microsoft.com/office/drawing/2014/main" id="{D5F6FC03-CEEB-4324-80FE-FF5134AB0573}"/>
+              </a:ext>
+            </a:extLst>
+          </p:cNvPr>
+          <p:cNvSpPr/>
+          <p:nvPr/>
+        </p:nvSpPr>
+        <p:spPr>
+          <a:xfrm>
+            <a:off x="7601923" y="2667000"/>
+            <a:ext cx="1012986" cy="285783"/>
+          </a:xfrm>
+          <a:prstGeom prst="rect">
+            <a:avLst/>
+          </a:prstGeom>
+          <a:ln w="19050">
+            <a:solidFill>
+              <a:srgbClr val="7030A0"/>
+            </a:solidFill>
+          </a:ln>
+          <a:effectLst/>
+        </p:spPr>
+        <p:style>
+          <a:lnRef idx="1">
+            <a:schemeClr val="accent4"/>
+          </a:lnRef>
+          <a:fillRef idx="2">
+            <a:schemeClr val="accent4"/>
+          </a:fillRef>
+          <a:effectRef idx="1">
+            <a:schemeClr val="accent4"/>
+          </a:effectRef>
+          <a:fontRef idx="minor">
+            <a:schemeClr val="dk1"/>
+          </a:fontRef>
+        </p:style>
+        <p:txBody>
+          <a:bodyPr rtlCol="0" anchor="ctr"/>
+          <a:lstStyle/>
+          <a:p>
+            <a:pPr algn="ctr"/>
+            <a:r>
+              <a:rPr lang="en-US" sz="1050" dirty="0" err="1">
+                <a:solidFill>
+                  <a:srgbClr val="7030A0"/>
+                </a:solidFill>
+              </a:rPr>
+              <a:t>RoomNumber</a:t>
+            </a:r>
+            <a:endParaRPr lang="en-SG" sz="1050" dirty="0">
+              <a:solidFill>
+                <a:srgbClr val="7030A0"/>
+              </a:solidFill>
+            </a:endParaRPr>
+          </a:p>
+        </p:txBody>
+      </p:sp>
+      <p:cxnSp>
+        <p:nvCxnSpPr>
+          <p:cNvPr id="98" name="Elbow Connector 78">
+            <a:extLst>
+              <a:ext uri="{FF2B5EF4-FFF2-40B4-BE49-F238E27FC236}">
+                <a16:creationId xmlns:a16="http://schemas.microsoft.com/office/drawing/2014/main" id="{4BF1364D-C4A0-4FAF-B3B4-3B790D150AE4}"/>
+              </a:ext>
+            </a:extLst>
+          </p:cNvPr>
+          <p:cNvCxnSpPr>
+            <a:cxnSpLocks/>
+            <a:stCxn id="87" idx="3"/>
+            <a:endCxn id="96" idx="1"/>
+          </p:cNvCxnSpPr>
+          <p:nvPr/>
+        </p:nvCxnSpPr>
+        <p:spPr>
+          <a:xfrm flipV="1">
+            <a:off x="7167521" y="2809892"/>
+            <a:ext cx="434402" cy="654151"/>
+          </a:xfrm>
+          <a:prstGeom prst="bentConnector3">
+            <a:avLst/>
+          </a:prstGeom>
+          <a:ln w="19050">
+            <a:solidFill>
+              <a:srgbClr val="7030A0"/>
+            </a:solidFill>
+            <a:headEnd type="none" w="med" len="med"/>
+            <a:tailEnd type="arrow" w="med" len="med"/>
+          </a:ln>
+          <a:effectLst/>
+        </p:spPr>
+        <p:style>
+          <a:lnRef idx="1">
+            <a:schemeClr val="accent2"/>
+          </a:lnRef>
+          <a:fillRef idx="2">
+            <a:schemeClr val="accent2"/>
+          </a:fillRef>
+          <a:effectRef idx="1">
+            <a:schemeClr val="accent2"/>
+          </a:effectRef>
+          <a:fontRef idx="minor">
+            <a:schemeClr val="dk1"/>
+          </a:fontRef>
+        </p:style>
+      </p:cxnSp>
+      <p:cxnSp>
+        <p:nvCxnSpPr>
+          <p:cNvPr id="101" name="Elbow Connector 106">
+            <a:extLst>
+              <a:ext uri="{FF2B5EF4-FFF2-40B4-BE49-F238E27FC236}">
+                <a16:creationId xmlns:a16="http://schemas.microsoft.com/office/drawing/2014/main" id="{64D92EA3-2905-4CEA-A2FC-4DDF7BE1B4DF}"/>
+              </a:ext>
+            </a:extLst>
+          </p:cNvPr>
+          <p:cNvCxnSpPr>
+            <a:cxnSpLocks/>
+            <a:stCxn id="9" idx="1"/>
+            <a:endCxn id="72" idx="2"/>
+          </p:cNvCxnSpPr>
+          <p:nvPr/>
+        </p:nvCxnSpPr>
+        <p:spPr>
+          <a:xfrm rot="5400000" flipH="1" flipV="1">
+            <a:off x="4062685" y="1323338"/>
+            <a:ext cx="187399" cy="4801821"/>
+          </a:xfrm>
+          <a:prstGeom prst="bentConnector3">
+            <a:avLst>
+              <a:gd name="adj1" fmla="val -129019"/>
+            </a:avLst>
+          </a:prstGeom>
+          <a:ln w="19050">
+            <a:solidFill>
+              <a:srgbClr val="7030A0"/>
+            </a:solidFill>
+            <a:prstDash val="solid"/>
+            <a:headEnd type="none" w="med" len="med"/>
+            <a:tailEnd type="arrow" w="med" len="med"/>
+          </a:ln>
+          <a:effectLst/>
+        </p:spPr>
+        <p:style>
+          <a:lnRef idx="1">
+            <a:schemeClr val="accent2"/>
+          </a:lnRef>
+          <a:fillRef idx="2">
+            <a:schemeClr val="accent2"/>
+          </a:fillRef>
+          <a:effectRef idx="1">
+            <a:schemeClr val="accent2"/>
+          </a:effectRef>
+          <a:fontRef idx="minor">
+            <a:schemeClr val="dk1"/>
+          </a:fontRef>
+        </p:style>
+      </p:cxnSp>
+      <p:sp>
+        <p:nvSpPr>
+          <p:cNvPr id="102" name="TextBox 101">
+            <a:extLst>
+              <a:ext uri="{FF2B5EF4-FFF2-40B4-BE49-F238E27FC236}">
+                <a16:creationId xmlns:a16="http://schemas.microsoft.com/office/drawing/2014/main" id="{3605C440-E344-4ABF-935F-7C8D210ED567}"/>
+              </a:ext>
+            </a:extLst>
+          </p:cNvPr>
+          <p:cNvSpPr txBox="1"/>
+          <p:nvPr/>
+        </p:nvSpPr>
+        <p:spPr>
+          <a:xfrm>
+            <a:off x="6596852" y="3664789"/>
+            <a:ext cx="189257" cy="178683"/>
+          </a:xfrm>
+          <a:prstGeom prst="rect">
+            <a:avLst/>
+          </a:prstGeom>
+          <a:noFill/>
+        </p:spPr>
+        <p:txBody>
+          <a:bodyPr wrap="square" lIns="0" tIns="0" rIns="0" bIns="0" rtlCol="0">
+            <a:noAutofit/>
+          </a:bodyPr>
+          <a:lstStyle/>
+          <a:p>
+            <a:pPr algn="ctr"/>
+            <a:r>
+              <a:rPr lang="en-US" sz="1100" dirty="0">
+                <a:solidFill>
+                  <a:srgbClr val="7030A0"/>
+                </a:solidFill>
+              </a:rPr>
+              <a:t>1</a:t>
+            </a:r>
+            <a:endParaRPr lang="en-SG" sz="1100" dirty="0">
+              <a:solidFill>
+                <a:srgbClr val="7030A0"/>
+              </a:solidFill>
+            </a:endParaRPr>
+          </a:p>
+        </p:txBody>
+      </p:sp>
+      <p:sp>
+        <p:nvSpPr>
+          <p:cNvPr id="103" name="TextBox 102">
+            <a:extLst>
+              <a:ext uri="{FF2B5EF4-FFF2-40B4-BE49-F238E27FC236}">
+                <a16:creationId xmlns:a16="http://schemas.microsoft.com/office/drawing/2014/main" id="{C587B232-E16E-4187-B320-EB70E94A019F}"/>
+              </a:ext>
+            </a:extLst>
+          </p:cNvPr>
+          <p:cNvSpPr txBox="1"/>
+          <p:nvPr/>
+        </p:nvSpPr>
+        <p:spPr>
+          <a:xfrm>
+            <a:off x="5566909" y="4081790"/>
+            <a:ext cx="881018" cy="261610"/>
+          </a:xfrm>
+          <a:prstGeom prst="rect">
+            <a:avLst/>
+          </a:prstGeom>
+          <a:noFill/>
+        </p:spPr>
+        <p:txBody>
+          <a:bodyPr wrap="square" rtlCol="0">
+            <a:spAutoFit/>
+          </a:bodyPr>
+          <a:lstStyle/>
+          <a:p>
+            <a:pPr algn="r"/>
+            <a:r>
+              <a:rPr lang="en-US" sz="1100" dirty="0">
+                <a:solidFill>
+                  <a:srgbClr val="7030A0"/>
+                </a:solidFill>
+              </a:rPr>
+              <a:t>filtered list</a:t>
+            </a:r>
+            <a:endParaRPr lang="en-SG" sz="1100" dirty="0">
+              <a:solidFill>
+                <a:srgbClr val="7030A0"/>
+              </a:solidFill>
+            </a:endParaRPr>
+          </a:p>
+        </p:txBody>
+      </p:sp>
+      <p:sp>
+        <p:nvSpPr>
+          <p:cNvPr id="104" name="Rectangle 8">
+            <a:extLst>
+              <a:ext uri="{FF2B5EF4-FFF2-40B4-BE49-F238E27FC236}">
+                <a16:creationId xmlns:a16="http://schemas.microsoft.com/office/drawing/2014/main" id="{B4857E6A-87B1-4B4B-BB2B-18BE749F0684}"/>
+              </a:ext>
+            </a:extLst>
+          </p:cNvPr>
+          <p:cNvSpPr/>
+          <p:nvPr/>
+        </p:nvSpPr>
+        <p:spPr>
+          <a:xfrm>
+            <a:off x="4429774" y="2832475"/>
+            <a:ext cx="660903" cy="346760"/>
+          </a:xfrm>
+          <a:prstGeom prst="rect">
+            <a:avLst/>
+          </a:prstGeom>
+          <a:ln w="19050">
+            <a:solidFill>
+              <a:srgbClr val="7030A0"/>
+            </a:solidFill>
+          </a:ln>
+          <a:effectLst/>
+        </p:spPr>
+        <p:style>
+          <a:lnRef idx="1">
+            <a:schemeClr val="accent4"/>
+          </a:lnRef>
+          <a:fillRef idx="2">
+            <a:schemeClr val="accent4"/>
+          </a:fillRef>
+          <a:effectRef idx="1">
+            <a:schemeClr val="accent4"/>
+          </a:effectRef>
+          <a:fontRef idx="minor">
+            <a:schemeClr val="dk1"/>
+          </a:fontRef>
+        </p:style>
+        <p:txBody>
+          <a:bodyPr rtlCol="0" anchor="ctr"/>
+          <a:lstStyle/>
+          <a:p>
+            <a:pPr algn="ctr"/>
+            <a:r>
+              <a:rPr lang="en-US" sz="1050" dirty="0">
+                <a:solidFill>
+                  <a:srgbClr val="7030A0"/>
+                </a:solidFill>
+              </a:rPr>
+              <a:t>Menu</a:t>
+            </a:r>
+            <a:endParaRPr lang="en-SG" sz="1050" dirty="0">
+              <a:solidFill>
+                <a:srgbClr val="7030A0"/>
+              </a:solidFill>
+            </a:endParaRPr>
+          </a:p>
+        </p:txBody>
+      </p:sp>
+      <p:sp>
+        <p:nvSpPr>
+          <p:cNvPr id="105" name="TextBox 104">
+            <a:extLst>
+              <a:ext uri="{FF2B5EF4-FFF2-40B4-BE49-F238E27FC236}">
+                <a16:creationId xmlns:a16="http://schemas.microsoft.com/office/drawing/2014/main" id="{96405100-F6D6-4434-9C19-B55DEFDFC76B}"/>
+              </a:ext>
+            </a:extLst>
+          </p:cNvPr>
+          <p:cNvSpPr txBox="1"/>
+          <p:nvPr/>
+        </p:nvSpPr>
+        <p:spPr>
+          <a:xfrm>
+            <a:off x="4195309" y="2789353"/>
+            <a:ext cx="172052" cy="178683"/>
+          </a:xfrm>
+          <a:prstGeom prst="rect">
+            <a:avLst/>
+          </a:prstGeom>
+          <a:noFill/>
+        </p:spPr>
+        <p:txBody>
+          <a:bodyPr wrap="square" lIns="0" tIns="0" rIns="0" bIns="0" rtlCol="0">
+            <a:noAutofit/>
+          </a:bodyPr>
+          <a:lstStyle/>
+          <a:p>
+            <a:pPr algn="ctr"/>
+            <a:r>
+              <a:rPr lang="en-US" sz="1100" dirty="0">
+                <a:solidFill>
+                  <a:srgbClr val="7030A0"/>
+                </a:solidFill>
+              </a:rPr>
+              <a:t>1</a:t>
+            </a:r>
+            <a:endParaRPr lang="en-SG" sz="1100" dirty="0">
+              <a:solidFill>
+                <a:srgbClr val="7030A0"/>
+              </a:solidFill>
+            </a:endParaRPr>
+          </a:p>
+        </p:txBody>
+      </p:sp>
+      <p:sp>
+        <p:nvSpPr>
+          <p:cNvPr id="106" name="Rectangle 8">
+            <a:extLst>
+              <a:ext uri="{FF2B5EF4-FFF2-40B4-BE49-F238E27FC236}">
+                <a16:creationId xmlns:a16="http://schemas.microsoft.com/office/drawing/2014/main" id="{06AB0EEA-2C5B-40F0-8189-2F66279696D2}"/>
+              </a:ext>
+            </a:extLst>
+          </p:cNvPr>
+          <p:cNvSpPr/>
+          <p:nvPr/>
+        </p:nvSpPr>
+        <p:spPr>
+          <a:xfrm>
+            <a:off x="5884103" y="2815933"/>
+            <a:ext cx="1031519" cy="346760"/>
+          </a:xfrm>
+          <a:prstGeom prst="rect">
+            <a:avLst/>
+          </a:prstGeom>
+          <a:ln w="19050">
+            <a:solidFill>
+              <a:srgbClr val="7030A0"/>
+            </a:solidFill>
+          </a:ln>
+          <a:effectLst/>
+        </p:spPr>
+        <p:style>
+          <a:lnRef idx="1">
+            <a:schemeClr val="accent4"/>
+          </a:lnRef>
+          <a:fillRef idx="2">
+            <a:schemeClr val="accent4"/>
+          </a:fillRef>
+          <a:effectRef idx="1">
+            <a:schemeClr val="accent4"/>
+          </a:effectRef>
+          <a:fontRef idx="minor">
+            <a:schemeClr val="dk1"/>
+          </a:fontRef>
+        </p:style>
+        <p:txBody>
+          <a:bodyPr rtlCol="0" anchor="ctr"/>
+          <a:lstStyle/>
+          <a:p>
+            <a:pPr algn="ctr"/>
+            <a:r>
+              <a:rPr lang="en-US" sz="1050" dirty="0" err="1">
+                <a:solidFill>
+                  <a:srgbClr val="7030A0"/>
+                </a:solidFill>
+              </a:rPr>
+              <a:t>ExpenseType</a:t>
+            </a:r>
+            <a:endParaRPr lang="en-SG" sz="1050" dirty="0">
+              <a:solidFill>
+                <a:srgbClr val="7030A0"/>
+              </a:solidFill>
+            </a:endParaRPr>
+          </a:p>
+        </p:txBody>
+      </p:sp>
+      <p:sp>
+        <p:nvSpPr>
+          <p:cNvPr id="108" name="Flowchart: Decision 96">
+            <a:extLst>
+              <a:ext uri="{FF2B5EF4-FFF2-40B4-BE49-F238E27FC236}">
+                <a16:creationId xmlns:a16="http://schemas.microsoft.com/office/drawing/2014/main" id="{3B51AC70-5C28-4069-B64C-B997DE624C99}"/>
+              </a:ext>
+            </a:extLst>
+          </p:cNvPr>
+          <p:cNvSpPr/>
+          <p:nvPr/>
+        </p:nvSpPr>
+        <p:spPr>
+          <a:xfrm>
+            <a:off x="5096945" y="2908410"/>
+            <a:ext cx="236048" cy="173380"/>
+          </a:xfrm>
+          <a:prstGeom prst="flowChartDecision">
+            <a:avLst/>
+          </a:prstGeom>
+          <a:noFill/>
+          <a:ln w="19050">
+            <a:solidFill>
+              <a:srgbClr val="7030A0"/>
+            </a:solidFill>
+          </a:ln>
+          <a:effectLst/>
+        </p:spPr>
+        <p:style>
+          <a:lnRef idx="1">
+            <a:schemeClr val="accent6"/>
+          </a:lnRef>
+          <a:fillRef idx="2">
+            <a:schemeClr val="accent6"/>
+          </a:fillRef>
+          <a:effectRef idx="1">
+            <a:schemeClr val="accent6"/>
+          </a:effectRef>
+          <a:fontRef idx="minor">
+            <a:schemeClr val="dk1"/>
+          </a:fontRef>
+        </p:style>
+        <p:txBody>
+          <a:bodyPr rtlCol="0" anchor="ctr"/>
+          <a:lstStyle/>
+          <a:p>
+            <a:pPr algn="ctr"/>
+            <a:endParaRPr lang="en-US" sz="1050"/>
+          </a:p>
+        </p:txBody>
+      </p:sp>
+      <p:cxnSp>
+        <p:nvCxnSpPr>
+          <p:cNvPr id="109" name="Elbow Connector 63">
+            <a:extLst>
+              <a:ext uri="{FF2B5EF4-FFF2-40B4-BE49-F238E27FC236}">
+                <a16:creationId xmlns:a16="http://schemas.microsoft.com/office/drawing/2014/main" id="{82B54C10-0851-48E9-BD96-66706598B37B}"/>
+              </a:ext>
+            </a:extLst>
+          </p:cNvPr>
+          <p:cNvCxnSpPr>
+            <a:cxnSpLocks/>
+            <a:stCxn id="108" idx="3"/>
+            <a:endCxn id="106" idx="1"/>
+          </p:cNvCxnSpPr>
+          <p:nvPr/>
+        </p:nvCxnSpPr>
+        <p:spPr>
+          <a:xfrm flipV="1">
+            <a:off x="5332993" y="2989313"/>
+            <a:ext cx="551110" cy="5787"/>
+          </a:xfrm>
+          <a:prstGeom prst="bentConnector3">
+            <a:avLst/>
+          </a:prstGeom>
+          <a:ln w="19050">
+            <a:solidFill>
+              <a:srgbClr val="7030A0"/>
+            </a:solidFill>
+            <a:headEnd type="none" w="med" len="med"/>
+            <a:tailEnd type="arrow" w="med" len="med"/>
+          </a:ln>
+          <a:effectLst/>
+        </p:spPr>
+        <p:style>
+          <a:lnRef idx="1">
+            <a:schemeClr val="accent2"/>
+          </a:lnRef>
+          <a:fillRef idx="2">
+            <a:schemeClr val="accent2"/>
+          </a:fillRef>
+          <a:effectRef idx="1">
+            <a:schemeClr val="accent2"/>
+          </a:effectRef>
+          <a:fontRef idx="minor">
+            <a:schemeClr val="dk1"/>
+          </a:fontRef>
+        </p:style>
+      </p:cxnSp>
+      <p:sp>
+        <p:nvSpPr>
+          <p:cNvPr id="110" name="TextBox 109">
+            <a:extLst>
+              <a:ext uri="{FF2B5EF4-FFF2-40B4-BE49-F238E27FC236}">
+                <a16:creationId xmlns:a16="http://schemas.microsoft.com/office/drawing/2014/main" id="{A3798FEC-E834-4C0A-A861-9369A851AEB1}"/>
+              </a:ext>
+            </a:extLst>
+          </p:cNvPr>
+          <p:cNvSpPr txBox="1"/>
+          <p:nvPr/>
+        </p:nvSpPr>
+        <p:spPr>
+          <a:xfrm>
+            <a:off x="5643464" y="2816540"/>
+            <a:ext cx="189257" cy="178683"/>
+          </a:xfrm>
+          <a:prstGeom prst="rect">
+            <a:avLst/>
+          </a:prstGeom>
+          <a:noFill/>
+        </p:spPr>
+        <p:txBody>
+          <a:bodyPr wrap="square" lIns="0" tIns="0" rIns="0" bIns="0" rtlCol="0">
+            <a:noAutofit/>
+          </a:bodyPr>
+          <a:lstStyle/>
+          <a:p>
+            <a:pPr algn="ctr"/>
+            <a:r>
+              <a:rPr lang="en-US" sz="1100" dirty="0">
+                <a:solidFill>
+                  <a:srgbClr val="7030A0"/>
+                </a:solidFill>
+              </a:rPr>
+              <a:t>*</a:t>
+            </a:r>
+            <a:endParaRPr lang="en-SG" sz="1100" dirty="0">
+              <a:solidFill>
+                <a:srgbClr val="7030A0"/>
+              </a:solidFill>
+            </a:endParaRPr>
+          </a:p>
+        </p:txBody>
+      </p:sp>
+      <p:cxnSp>
+        <p:nvCxnSpPr>
+          <p:cNvPr id="127" name="Elbow Connector 78">
+            <a:extLst>
+              <a:ext uri="{FF2B5EF4-FFF2-40B4-BE49-F238E27FC236}">
+                <a16:creationId xmlns:a16="http://schemas.microsoft.com/office/drawing/2014/main" id="{A04BC9A8-415C-41D7-90CC-956F84B0921E}"/>
+              </a:ext>
+            </a:extLst>
+          </p:cNvPr>
+          <p:cNvCxnSpPr>
+            <a:cxnSpLocks/>
+            <a:endCxn id="104" idx="1"/>
+          </p:cNvCxnSpPr>
+          <p:nvPr/>
+        </p:nvCxnSpPr>
+        <p:spPr>
+          <a:xfrm>
+            <a:off x="4108129" y="3002989"/>
+            <a:ext cx="321645" cy="2866"/>
+          </a:xfrm>
+          <a:prstGeom prst="bentConnector3">
+            <a:avLst>
+              <a:gd name="adj1" fmla="val 50000"/>
+            </a:avLst>
+          </a:prstGeom>
+          <a:ln w="19050">
+            <a:solidFill>
+              <a:srgbClr val="7030A0"/>
+            </a:solidFill>
+            <a:headEnd type="none" w="med" len="med"/>
+            <a:tailEnd type="arrow" w="med" len="med"/>
           </a:ln>
           <a:effectLst/>
         </p:spPr>
@@ -5645,6 +7072,36 @@
     <p:extLst>
       <p:ext uri="{BB962C8B-B14F-4D97-AF65-F5344CB8AC3E}">
         <p14:creationId xmlns:p14="http://schemas.microsoft.com/office/powerpoint/2010/main" val="2396968029"/>
+      </p:ext>
+    </p:extLst>
+  </p:cSld>
+  <p:clrMapOvr>
+    <a:masterClrMapping/>
+  </p:clrMapOvr>
+</p:sld>
+</file>
+
+<file path=ppt/slides/slide2.xml><?xml version="1.0" encoding="utf-8"?>
+<p:sld xmlns:a="http://schemas.openxmlformats.org/drawingml/2006/main" xmlns:r="http://schemas.openxmlformats.org/officeDocument/2006/relationships" xmlns:p="http://schemas.openxmlformats.org/presentationml/2006/main">
+  <p:cSld>
+    <p:spTree>
+      <p:nvGrpSpPr>
+        <p:cNvPr id="1" name=""/>
+        <p:cNvGrpSpPr/>
+        <p:nvPr/>
+      </p:nvGrpSpPr>
+      <p:grpSpPr>
+        <a:xfrm>
+          <a:off x="0" y="0"/>
+          <a:ext cx="0" cy="0"/>
+          <a:chOff x="0" y="0"/>
+          <a:chExt cx="0" cy="0"/>
+        </a:xfrm>
+      </p:grpSpPr>
+    </p:spTree>
+    <p:extLst>
+      <p:ext uri="{BB962C8B-B14F-4D97-AF65-F5344CB8AC3E}">
+        <p14:creationId xmlns:p14="http://schemas.microsoft.com/office/powerpoint/2010/main" val="1196823385"/>
       </p:ext>
     </p:extLst>
   </p:cSld>

</xml_diff>